<commit_message>
updates to res week chapter and include material from NIST requirements doc
</commit_message>
<xml_diff>
--- a/chapter-intro/diagrams/diagrams.pptx
+++ b/chapter-intro/diagrams/diagrams.pptx
@@ -1731,7 +1731,7 @@
 <dgm:dataModel xmlns:dgm="http://schemas.openxmlformats.org/drawingml/2006/diagram" xmlns:a="http://schemas.openxmlformats.org/drawingml/2006/main">
   <dgm:ptLst>
     <dgm:pt modelId="{86BAFBF2-36AA-41D2-90DA-8C75879C23E2}" type="doc">
-      <dgm:prSet loTypeId="urn:microsoft.com/office/officeart/2005/8/layout/target2" loCatId="relationship" qsTypeId="urn:microsoft.com/office/officeart/2005/8/quickstyle/simple1" qsCatId="simple" csTypeId="urn:microsoft.com/office/officeart/2005/8/colors/accent0_1" csCatId="mainScheme" phldr="1"/>
+      <dgm:prSet loTypeId="urn:microsoft.com/office/officeart/2005/8/layout/radial6" loCatId="relationship" qsTypeId="urn:microsoft.com/office/officeart/2005/8/quickstyle/simple1" qsCatId="simple" csTypeId="urn:microsoft.com/office/officeart/2005/8/colors/accent0_1" csCatId="mainScheme" phldr="1"/>
       <dgm:spPr/>
       <dgm:t>
         <a:bodyPr/>
@@ -1993,129 +1993,159 @@
         </a:p>
       </dgm:t>
     </dgm:pt>
-    <dgm:pt modelId="{0D918C27-B8BE-469E-B69C-54B7A732E0A6}" type="pres">
+    <dgm:pt modelId="{73486626-F990-41CF-B751-2BF8D52EFF33}" type="pres">
       <dgm:prSet presAssocID="{86BAFBF2-36AA-41D2-90DA-8C75879C23E2}" presName="Name0" presStyleCnt="0">
         <dgm:presLayoutVars>
-          <dgm:chMax val="3"/>
-          <dgm:chPref val="1"/>
+          <dgm:chMax val="1"/>
           <dgm:dir/>
-          <dgm:animLvl val="lvl"/>
-          <dgm:resizeHandles/>
+          <dgm:animLvl val="ctr"/>
+          <dgm:resizeHandles val="exact"/>
         </dgm:presLayoutVars>
       </dgm:prSet>
       <dgm:spPr/>
     </dgm:pt>
-    <dgm:pt modelId="{95589480-0D0D-41C2-8617-044841E56D4E}" type="pres">
-      <dgm:prSet presAssocID="{86BAFBF2-36AA-41D2-90DA-8C75879C23E2}" presName="outerBox" presStyleCnt="0"/>
-      <dgm:spPr/>
-    </dgm:pt>
-    <dgm:pt modelId="{AAE40553-F7AD-465E-BE68-E44F52EBA75A}" type="pres">
-      <dgm:prSet presAssocID="{86BAFBF2-36AA-41D2-90DA-8C75879C23E2}" presName="outerBoxParent" presStyleLbl="node1" presStyleIdx="0" presStyleCnt="1"/>
-      <dgm:spPr/>
-    </dgm:pt>
-    <dgm:pt modelId="{44EFEACD-BBCF-471F-B460-8A494E7D7354}" type="pres">
-      <dgm:prSet presAssocID="{86BAFBF2-36AA-41D2-90DA-8C75879C23E2}" presName="outerBoxChildren" presStyleCnt="0"/>
-      <dgm:spPr/>
-    </dgm:pt>
-    <dgm:pt modelId="{1C1FE47E-6332-497B-AE27-AA2B02B2B0A4}" type="pres">
-      <dgm:prSet presAssocID="{3D010A4F-5429-4F14-8E85-954F168731C8}" presName="oChild" presStyleLbl="fgAcc1" presStyleIdx="0" presStyleCnt="6">
+    <dgm:pt modelId="{5828CD21-1A64-4409-91D1-CF2DECC09F01}" type="pres">
+      <dgm:prSet presAssocID="{46C7ECE5-9C05-4844-8701-735A0719D12D}" presName="centerShape" presStyleLbl="node0" presStyleIdx="0" presStyleCnt="1"/>
+      <dgm:spPr/>
+    </dgm:pt>
+    <dgm:pt modelId="{4F643DB7-EE65-4DF5-B417-DA10D3CD6A39}" type="pres">
+      <dgm:prSet presAssocID="{3D010A4F-5429-4F14-8E85-954F168731C8}" presName="node" presStyleLbl="node1" presStyleIdx="0" presStyleCnt="6">
         <dgm:presLayoutVars>
           <dgm:bulletEnabled val="1"/>
         </dgm:presLayoutVars>
       </dgm:prSet>
       <dgm:spPr/>
     </dgm:pt>
-    <dgm:pt modelId="{90EE1E71-5690-4BD1-8000-95F8DA307A24}" type="pres">
-      <dgm:prSet presAssocID="{932F1A27-884F-48EE-897D-9CF79C7FA33E}" presName="outerSibTrans" presStyleCnt="0"/>
-      <dgm:spPr/>
-    </dgm:pt>
-    <dgm:pt modelId="{0BDC1031-AD1A-4D79-AB74-C17488B0F667}" type="pres">
-      <dgm:prSet presAssocID="{B9DAE7F8-054F-4B6C-B658-191498EE557D}" presName="oChild" presStyleLbl="fgAcc1" presStyleIdx="1" presStyleCnt="6">
+    <dgm:pt modelId="{81993A29-6DB6-4EEA-8FC0-91A5C1CA2F2B}" type="pres">
+      <dgm:prSet presAssocID="{3D010A4F-5429-4F14-8E85-954F168731C8}" presName="dummy" presStyleCnt="0"/>
+      <dgm:spPr/>
+    </dgm:pt>
+    <dgm:pt modelId="{B68EE014-DCEC-4C45-9753-52C6B6525200}" type="pres">
+      <dgm:prSet presAssocID="{932F1A27-884F-48EE-897D-9CF79C7FA33E}" presName="sibTrans" presStyleLbl="sibTrans2D1" presStyleIdx="0" presStyleCnt="6"/>
+      <dgm:spPr/>
+    </dgm:pt>
+    <dgm:pt modelId="{D27A5CC6-601F-464A-83A2-80F163E9C832}" type="pres">
+      <dgm:prSet presAssocID="{B9DAE7F8-054F-4B6C-B658-191498EE557D}" presName="node" presStyleLbl="node1" presStyleIdx="1" presStyleCnt="6">
         <dgm:presLayoutVars>
           <dgm:bulletEnabled val="1"/>
         </dgm:presLayoutVars>
       </dgm:prSet>
       <dgm:spPr/>
     </dgm:pt>
-    <dgm:pt modelId="{A426B992-7A69-4C69-A94C-BAEDF41CFD71}" type="pres">
-      <dgm:prSet presAssocID="{8E36131A-21B8-493D-A4C0-228BD3B5B116}" presName="outerSibTrans" presStyleCnt="0"/>
-      <dgm:spPr/>
-    </dgm:pt>
-    <dgm:pt modelId="{B2EB2BAD-E656-4C56-AF49-D0FA9B44C748}" type="pres">
-      <dgm:prSet presAssocID="{CA427819-FB33-4E0F-8D10-BED2E9B5FE90}" presName="oChild" presStyleLbl="fgAcc1" presStyleIdx="2" presStyleCnt="6">
+    <dgm:pt modelId="{535E871F-F580-45E9-A492-7DAD1DF17514}" type="pres">
+      <dgm:prSet presAssocID="{B9DAE7F8-054F-4B6C-B658-191498EE557D}" presName="dummy" presStyleCnt="0"/>
+      <dgm:spPr/>
+    </dgm:pt>
+    <dgm:pt modelId="{9E5DBB9B-5897-473C-96E3-D833F32D0843}" type="pres">
+      <dgm:prSet presAssocID="{8E36131A-21B8-493D-A4C0-228BD3B5B116}" presName="sibTrans" presStyleLbl="sibTrans2D1" presStyleIdx="1" presStyleCnt="6"/>
+      <dgm:spPr/>
+    </dgm:pt>
+    <dgm:pt modelId="{B1C48636-7ABF-4FB6-8658-2DC2873F927A}" type="pres">
+      <dgm:prSet presAssocID="{CA427819-FB33-4E0F-8D10-BED2E9B5FE90}" presName="node" presStyleLbl="node1" presStyleIdx="2" presStyleCnt="6">
         <dgm:presLayoutVars>
           <dgm:bulletEnabled val="1"/>
         </dgm:presLayoutVars>
       </dgm:prSet>
       <dgm:spPr/>
     </dgm:pt>
-    <dgm:pt modelId="{479FC97A-58D4-44A9-B477-4DCC947AC674}" type="pres">
-      <dgm:prSet presAssocID="{CA98C05D-49E1-4192-9BAE-955674EDC2E7}" presName="outerSibTrans" presStyleCnt="0"/>
-      <dgm:spPr/>
-    </dgm:pt>
-    <dgm:pt modelId="{D6B94978-CBF6-49A3-87AD-9F6B2E28C34A}" type="pres">
-      <dgm:prSet presAssocID="{B212E583-7E31-4465-AA3E-0AE51071378D}" presName="oChild" presStyleLbl="fgAcc1" presStyleIdx="3" presStyleCnt="6">
+    <dgm:pt modelId="{FE22B466-1DA8-4609-BBD3-B72768957859}" type="pres">
+      <dgm:prSet presAssocID="{CA427819-FB33-4E0F-8D10-BED2E9B5FE90}" presName="dummy" presStyleCnt="0"/>
+      <dgm:spPr/>
+    </dgm:pt>
+    <dgm:pt modelId="{7E312E4B-6337-4E88-992C-060C27CE48D1}" type="pres">
+      <dgm:prSet presAssocID="{CA98C05D-49E1-4192-9BAE-955674EDC2E7}" presName="sibTrans" presStyleLbl="sibTrans2D1" presStyleIdx="2" presStyleCnt="6"/>
+      <dgm:spPr/>
+    </dgm:pt>
+    <dgm:pt modelId="{BF0E52B9-D139-4673-88CA-DBA78922F7B5}" type="pres">
+      <dgm:prSet presAssocID="{B212E583-7E31-4465-AA3E-0AE51071378D}" presName="node" presStyleLbl="node1" presStyleIdx="3" presStyleCnt="6">
         <dgm:presLayoutVars>
           <dgm:bulletEnabled val="1"/>
         </dgm:presLayoutVars>
       </dgm:prSet>
       <dgm:spPr/>
     </dgm:pt>
-    <dgm:pt modelId="{B9C38041-F5D2-4C9A-B6C0-6A4E63B676CE}" type="pres">
-      <dgm:prSet presAssocID="{4FAAA736-7B35-4ED3-809D-0D2BA3B760EB}" presName="outerSibTrans" presStyleCnt="0"/>
-      <dgm:spPr/>
-    </dgm:pt>
-    <dgm:pt modelId="{1C99F551-3349-4CE9-BF6E-415336B8882E}" type="pres">
-      <dgm:prSet presAssocID="{A546B4D7-37EA-4DEB-BC69-3DD634097985}" presName="oChild" presStyleLbl="fgAcc1" presStyleIdx="4" presStyleCnt="6">
+    <dgm:pt modelId="{27220506-D456-4EBE-9C23-F6E24979E4FC}" type="pres">
+      <dgm:prSet presAssocID="{B212E583-7E31-4465-AA3E-0AE51071378D}" presName="dummy" presStyleCnt="0"/>
+      <dgm:spPr/>
+    </dgm:pt>
+    <dgm:pt modelId="{64688F6A-3CFA-46B4-AF65-9AD28AE9C41C}" type="pres">
+      <dgm:prSet presAssocID="{4FAAA736-7B35-4ED3-809D-0D2BA3B760EB}" presName="sibTrans" presStyleLbl="sibTrans2D1" presStyleIdx="3" presStyleCnt="6"/>
+      <dgm:spPr/>
+    </dgm:pt>
+    <dgm:pt modelId="{BDE57BE5-7B34-4BA1-AC25-3351D981DC7D}" type="pres">
+      <dgm:prSet presAssocID="{A546B4D7-37EA-4DEB-BC69-3DD634097985}" presName="node" presStyleLbl="node1" presStyleIdx="4" presStyleCnt="6">
         <dgm:presLayoutVars>
           <dgm:bulletEnabled val="1"/>
         </dgm:presLayoutVars>
       </dgm:prSet>
       <dgm:spPr/>
     </dgm:pt>
-    <dgm:pt modelId="{842BC400-830C-4668-9DDC-8BB6F7C0E0F7}" type="pres">
-      <dgm:prSet presAssocID="{4B270560-A5A6-40A5-A039-26C06B432C62}" presName="outerSibTrans" presStyleCnt="0"/>
-      <dgm:spPr/>
-    </dgm:pt>
-    <dgm:pt modelId="{BD4107E8-4318-4BEC-AE3A-17A2882B7ADA}" type="pres">
-      <dgm:prSet presAssocID="{FC8C49D8-B1F8-4F8C-8E4B-C885AD85D8DB}" presName="oChild" presStyleLbl="fgAcc1" presStyleIdx="5" presStyleCnt="6">
+    <dgm:pt modelId="{CAC1A429-44DA-4538-806E-5DD4C4F779E8}" type="pres">
+      <dgm:prSet presAssocID="{A546B4D7-37EA-4DEB-BC69-3DD634097985}" presName="dummy" presStyleCnt="0"/>
+      <dgm:spPr/>
+    </dgm:pt>
+    <dgm:pt modelId="{73CD95A2-B381-4058-A65C-B634E03B9B7A}" type="pres">
+      <dgm:prSet presAssocID="{4B270560-A5A6-40A5-A039-26C06B432C62}" presName="sibTrans" presStyleLbl="sibTrans2D1" presStyleIdx="4" presStyleCnt="6"/>
+      <dgm:spPr/>
+    </dgm:pt>
+    <dgm:pt modelId="{93FE6F2E-B011-4F6E-969E-EAAA38F5D908}" type="pres">
+      <dgm:prSet presAssocID="{FC8C49D8-B1F8-4F8C-8E4B-C885AD85D8DB}" presName="node" presStyleLbl="node1" presStyleIdx="5" presStyleCnt="6">
         <dgm:presLayoutVars>
           <dgm:bulletEnabled val="1"/>
         </dgm:presLayoutVars>
       </dgm:prSet>
       <dgm:spPr/>
     </dgm:pt>
+    <dgm:pt modelId="{D4AF7D88-8A29-456B-B576-1E33E6F859A0}" type="pres">
+      <dgm:prSet presAssocID="{FC8C49D8-B1F8-4F8C-8E4B-C885AD85D8DB}" presName="dummy" presStyleCnt="0"/>
+      <dgm:spPr/>
+    </dgm:pt>
+    <dgm:pt modelId="{4C0E6876-333E-401E-8ABB-9BFFD19E0C59}" type="pres">
+      <dgm:prSet presAssocID="{E6279BF8-5F4C-4DBD-A5B3-F8105CC8E1E7}" presName="sibTrans" presStyleLbl="sibTrans2D1" presStyleIdx="5" presStyleCnt="6"/>
+      <dgm:spPr/>
+    </dgm:pt>
   </dgm:ptLst>
   <dgm:cxnLst>
     <dgm:cxn modelId="{0C874503-FA17-4F36-9DB2-42CAB404546A}" srcId="{46C7ECE5-9C05-4844-8701-735A0719D12D}" destId="{B9DAE7F8-054F-4B6C-B658-191498EE557D}" srcOrd="1" destOrd="0" parTransId="{6336CB53-7027-4A4E-A942-D3FF22A8C56A}" sibTransId="{8E36131A-21B8-493D-A4C0-228BD3B5B116}"/>
-    <dgm:cxn modelId="{11823A22-D3E8-45F8-8CBB-7C83C071CB20}" type="presOf" srcId="{FC8C49D8-B1F8-4F8C-8E4B-C885AD85D8DB}" destId="{BD4107E8-4318-4BEC-AE3A-17A2882B7ADA}" srcOrd="0" destOrd="0" presId="urn:microsoft.com/office/officeart/2005/8/layout/target2"/>
-    <dgm:cxn modelId="{42301025-3622-4F16-86EA-5D1A9AC2A530}" type="presOf" srcId="{B212E583-7E31-4465-AA3E-0AE51071378D}" destId="{D6B94978-CBF6-49A3-87AD-9F6B2E28C34A}" srcOrd="0" destOrd="0" presId="urn:microsoft.com/office/officeart/2005/8/layout/target2"/>
-    <dgm:cxn modelId="{8825A93C-39B9-4C78-8280-9C6CE61D1416}" type="presOf" srcId="{CA427819-FB33-4E0F-8D10-BED2E9B5FE90}" destId="{B2EB2BAD-E656-4C56-AF49-D0FA9B44C748}" srcOrd="0" destOrd="0" presId="urn:microsoft.com/office/officeart/2005/8/layout/target2"/>
-    <dgm:cxn modelId="{6855D43C-0529-4D25-8937-7D286EBF47FA}" type="presOf" srcId="{A546B4D7-37EA-4DEB-BC69-3DD634097985}" destId="{1C99F551-3349-4CE9-BF6E-415336B8882E}" srcOrd="0" destOrd="0" presId="urn:microsoft.com/office/officeart/2005/8/layout/target2"/>
-    <dgm:cxn modelId="{A5E2083E-0C14-4B85-B7F0-1524E3EFB229}" type="presOf" srcId="{B9DAE7F8-054F-4B6C-B658-191498EE557D}" destId="{0BDC1031-AD1A-4D79-AB74-C17488B0F667}" srcOrd="0" destOrd="0" presId="urn:microsoft.com/office/officeart/2005/8/layout/target2"/>
-    <dgm:cxn modelId="{FD6D784F-1181-46FB-9E1C-3D390CC0F8B6}" type="presOf" srcId="{46C7ECE5-9C05-4844-8701-735A0719D12D}" destId="{AAE40553-F7AD-465E-BE68-E44F52EBA75A}" srcOrd="0" destOrd="0" presId="urn:microsoft.com/office/officeart/2005/8/layout/target2"/>
+    <dgm:cxn modelId="{D8AA6415-D3D8-48BC-867F-9B088B7E203F}" type="presOf" srcId="{932F1A27-884F-48EE-897D-9CF79C7FA33E}" destId="{B68EE014-DCEC-4C45-9753-52C6B6525200}" srcOrd="0" destOrd="0" presId="urn:microsoft.com/office/officeart/2005/8/layout/radial6"/>
+    <dgm:cxn modelId="{B3D24517-E06B-4214-B739-0865FF45AD52}" type="presOf" srcId="{B9DAE7F8-054F-4B6C-B658-191498EE557D}" destId="{D27A5CC6-601F-464A-83A2-80F163E9C832}" srcOrd="0" destOrd="0" presId="urn:microsoft.com/office/officeart/2005/8/layout/radial6"/>
+    <dgm:cxn modelId="{7D9A0A1E-0E4F-4061-B9ED-E56DB90E0924}" type="presOf" srcId="{CA98C05D-49E1-4192-9BAE-955674EDC2E7}" destId="{7E312E4B-6337-4E88-992C-060C27CE48D1}" srcOrd="0" destOrd="0" presId="urn:microsoft.com/office/officeart/2005/8/layout/radial6"/>
+    <dgm:cxn modelId="{52A8E225-CD2B-4311-B23D-0C35224B7B05}" type="presOf" srcId="{FC8C49D8-B1F8-4F8C-8E4B-C885AD85D8DB}" destId="{93FE6F2E-B011-4F6E-969E-EAAA38F5D908}" srcOrd="0" destOrd="0" presId="urn:microsoft.com/office/officeart/2005/8/layout/radial6"/>
+    <dgm:cxn modelId="{12867126-DC97-4C5A-9124-07BB1090D125}" type="presOf" srcId="{86BAFBF2-36AA-41D2-90DA-8C75879C23E2}" destId="{73486626-F990-41CF-B751-2BF8D52EFF33}" srcOrd="0" destOrd="0" presId="urn:microsoft.com/office/officeart/2005/8/layout/radial6"/>
+    <dgm:cxn modelId="{189AF92E-8B27-4CDE-B011-A80A66B048B9}" type="presOf" srcId="{4B270560-A5A6-40A5-A039-26C06B432C62}" destId="{73CD95A2-B381-4058-A65C-B634E03B9B7A}" srcOrd="0" destOrd="0" presId="urn:microsoft.com/office/officeart/2005/8/layout/radial6"/>
+    <dgm:cxn modelId="{EABBAF3D-61EA-43BF-8344-60363CCD4547}" type="presOf" srcId="{B212E583-7E31-4465-AA3E-0AE51071378D}" destId="{BF0E52B9-D139-4673-88CA-DBA78922F7B5}" srcOrd="0" destOrd="0" presId="urn:microsoft.com/office/officeart/2005/8/layout/radial6"/>
+    <dgm:cxn modelId="{A4E36274-8174-4E7B-8FEE-2377A2C46D0C}" type="presOf" srcId="{A546B4D7-37EA-4DEB-BC69-3DD634097985}" destId="{BDE57BE5-7B34-4BA1-AC25-3351D981DC7D}" srcOrd="0" destOrd="0" presId="urn:microsoft.com/office/officeart/2005/8/layout/radial6"/>
     <dgm:cxn modelId="{A534FC55-1BA7-43D9-A552-1744F1A4508C}" srcId="{46C7ECE5-9C05-4844-8701-735A0719D12D}" destId="{CA427819-FB33-4E0F-8D10-BED2E9B5FE90}" srcOrd="2" destOrd="0" parTransId="{AAB2577F-C803-4CDB-8419-2412BAFDF9BE}" sibTransId="{CA98C05D-49E1-4192-9BAE-955674EDC2E7}"/>
-    <dgm:cxn modelId="{6E46CA56-373F-45C4-8829-6452ED8228F3}" type="presOf" srcId="{3D010A4F-5429-4F14-8E85-954F168731C8}" destId="{1C1FE47E-6332-497B-AE27-AA2B02B2B0A4}" srcOrd="0" destOrd="0" presId="urn:microsoft.com/office/officeart/2005/8/layout/target2"/>
+    <dgm:cxn modelId="{8DCF0D92-888A-490E-B383-599F718A346F}" type="presOf" srcId="{E6279BF8-5F4C-4DBD-A5B3-F8105CC8E1E7}" destId="{4C0E6876-333E-401E-8ABB-9BFFD19E0C59}" srcOrd="0" destOrd="0" presId="urn:microsoft.com/office/officeart/2005/8/layout/radial6"/>
+    <dgm:cxn modelId="{585E6798-DE88-4C19-8F96-ECC827041ACF}" type="presOf" srcId="{46C7ECE5-9C05-4844-8701-735A0719D12D}" destId="{5828CD21-1A64-4409-91D1-CF2DECC09F01}" srcOrd="0" destOrd="0" presId="urn:microsoft.com/office/officeart/2005/8/layout/radial6"/>
     <dgm:cxn modelId="{C9A2F6A2-7FA6-4F58-AD43-42F403B31A27}" srcId="{46C7ECE5-9C05-4844-8701-735A0719D12D}" destId="{B212E583-7E31-4465-AA3E-0AE51071378D}" srcOrd="3" destOrd="0" parTransId="{04944895-FFD6-40E9-9B11-BF53E8E391DC}" sibTransId="{4FAAA736-7B35-4ED3-809D-0D2BA3B760EB}"/>
     <dgm:cxn modelId="{34F6BCA6-5BB5-43AB-9B04-4DD1ED1A0B0D}" srcId="{46C7ECE5-9C05-4844-8701-735A0719D12D}" destId="{A546B4D7-37EA-4DEB-BC69-3DD634097985}" srcOrd="4" destOrd="0" parTransId="{4ED433DB-5B58-4FC6-8B87-2A3C545B51E8}" sibTransId="{4B270560-A5A6-40A5-A039-26C06B432C62}"/>
     <dgm:cxn modelId="{096684C5-C3A6-4192-9D0B-87B2BBE32293}" srcId="{46C7ECE5-9C05-4844-8701-735A0719D12D}" destId="{3D010A4F-5429-4F14-8E85-954F168731C8}" srcOrd="0" destOrd="0" parTransId="{6F16C0F6-D823-4C3B-9B85-CCA2BEB2AFB8}" sibTransId="{932F1A27-884F-48EE-897D-9CF79C7FA33E}"/>
     <dgm:cxn modelId="{C7BAE0C8-EDFC-43A1-B4CD-28DFB9A7B090}" srcId="{86BAFBF2-36AA-41D2-90DA-8C75879C23E2}" destId="{46C7ECE5-9C05-4844-8701-735A0719D12D}" srcOrd="0" destOrd="0" parTransId="{9449ADDC-A58A-4DA5-9EAC-80BA4228BD11}" sibTransId="{7DC0F9D2-B888-4706-8838-80BF8388749E}"/>
+    <dgm:cxn modelId="{E890A8CB-3CBC-4B26-ADA7-C28FAE543107}" type="presOf" srcId="{8E36131A-21B8-493D-A4C0-228BD3B5B116}" destId="{9E5DBB9B-5897-473C-96E3-D833F32D0843}" srcOrd="0" destOrd="0" presId="urn:microsoft.com/office/officeart/2005/8/layout/radial6"/>
+    <dgm:cxn modelId="{C3F6ADCE-FD95-4C42-9500-224D2DFDA47C}" type="presOf" srcId="{3D010A4F-5429-4F14-8E85-954F168731C8}" destId="{4F643DB7-EE65-4DF5-B417-DA10D3CD6A39}" srcOrd="0" destOrd="0" presId="urn:microsoft.com/office/officeart/2005/8/layout/radial6"/>
     <dgm:cxn modelId="{AD5837D4-D45A-43B9-BD91-909B8968F18F}" srcId="{46C7ECE5-9C05-4844-8701-735A0719D12D}" destId="{FC8C49D8-B1F8-4F8C-8E4B-C885AD85D8DB}" srcOrd="5" destOrd="0" parTransId="{11AAAB46-644F-40C1-A097-DD0ADFA140B3}" sibTransId="{E6279BF8-5F4C-4DBD-A5B3-F8105CC8E1E7}"/>
-    <dgm:cxn modelId="{9B06ACF9-305B-436B-ABE2-09E35A0F3E3A}" type="presOf" srcId="{86BAFBF2-36AA-41D2-90DA-8C75879C23E2}" destId="{0D918C27-B8BE-469E-B69C-54B7A732E0A6}" srcOrd="0" destOrd="0" presId="urn:microsoft.com/office/officeart/2005/8/layout/target2"/>
-    <dgm:cxn modelId="{8B703946-56FF-4469-B599-69817DD0788F}" type="presParOf" srcId="{0D918C27-B8BE-469E-B69C-54B7A732E0A6}" destId="{95589480-0D0D-41C2-8617-044841E56D4E}" srcOrd="0" destOrd="0" presId="urn:microsoft.com/office/officeart/2005/8/layout/target2"/>
-    <dgm:cxn modelId="{E7BEDB10-DD26-4070-9369-1D480E8B227B}" type="presParOf" srcId="{95589480-0D0D-41C2-8617-044841E56D4E}" destId="{AAE40553-F7AD-465E-BE68-E44F52EBA75A}" srcOrd="0" destOrd="0" presId="urn:microsoft.com/office/officeart/2005/8/layout/target2"/>
-    <dgm:cxn modelId="{692E606F-BA28-4827-8FE6-F8A66D1E5FB1}" type="presParOf" srcId="{95589480-0D0D-41C2-8617-044841E56D4E}" destId="{44EFEACD-BBCF-471F-B460-8A494E7D7354}" srcOrd="1" destOrd="0" presId="urn:microsoft.com/office/officeart/2005/8/layout/target2"/>
-    <dgm:cxn modelId="{5ABAB20D-0B34-4A54-A45F-446E9DF4E15D}" type="presParOf" srcId="{44EFEACD-BBCF-471F-B460-8A494E7D7354}" destId="{1C1FE47E-6332-497B-AE27-AA2B02B2B0A4}" srcOrd="0" destOrd="0" presId="urn:microsoft.com/office/officeart/2005/8/layout/target2"/>
-    <dgm:cxn modelId="{08B2E0EA-4E81-4B83-A8A5-251250A32AD7}" type="presParOf" srcId="{44EFEACD-BBCF-471F-B460-8A494E7D7354}" destId="{90EE1E71-5690-4BD1-8000-95F8DA307A24}" srcOrd="1" destOrd="0" presId="urn:microsoft.com/office/officeart/2005/8/layout/target2"/>
-    <dgm:cxn modelId="{E19067E5-66DD-4584-8005-67D8E2C1109C}" type="presParOf" srcId="{44EFEACD-BBCF-471F-B460-8A494E7D7354}" destId="{0BDC1031-AD1A-4D79-AB74-C17488B0F667}" srcOrd="2" destOrd="0" presId="urn:microsoft.com/office/officeart/2005/8/layout/target2"/>
-    <dgm:cxn modelId="{C2D2CDFA-EC5E-40B8-BCC7-DDC2145B1433}" type="presParOf" srcId="{44EFEACD-BBCF-471F-B460-8A494E7D7354}" destId="{A426B992-7A69-4C69-A94C-BAEDF41CFD71}" srcOrd="3" destOrd="0" presId="urn:microsoft.com/office/officeart/2005/8/layout/target2"/>
-    <dgm:cxn modelId="{2FB8CADE-9BDA-4C7A-A700-016543F13AFE}" type="presParOf" srcId="{44EFEACD-BBCF-471F-B460-8A494E7D7354}" destId="{B2EB2BAD-E656-4C56-AF49-D0FA9B44C748}" srcOrd="4" destOrd="0" presId="urn:microsoft.com/office/officeart/2005/8/layout/target2"/>
-    <dgm:cxn modelId="{FDBAB46D-CBAB-44DF-9993-D2EE3EA72B92}" type="presParOf" srcId="{44EFEACD-BBCF-471F-B460-8A494E7D7354}" destId="{479FC97A-58D4-44A9-B477-4DCC947AC674}" srcOrd="5" destOrd="0" presId="urn:microsoft.com/office/officeart/2005/8/layout/target2"/>
-    <dgm:cxn modelId="{31A59A86-A6C4-4019-B3AE-FB4AE5C8C47A}" type="presParOf" srcId="{44EFEACD-BBCF-471F-B460-8A494E7D7354}" destId="{D6B94978-CBF6-49A3-87AD-9F6B2E28C34A}" srcOrd="6" destOrd="0" presId="urn:microsoft.com/office/officeart/2005/8/layout/target2"/>
-    <dgm:cxn modelId="{27E3A909-B401-48BD-8F64-F404A3DAC078}" type="presParOf" srcId="{44EFEACD-BBCF-471F-B460-8A494E7D7354}" destId="{B9C38041-F5D2-4C9A-B6C0-6A4E63B676CE}" srcOrd="7" destOrd="0" presId="urn:microsoft.com/office/officeart/2005/8/layout/target2"/>
-    <dgm:cxn modelId="{DE3F4980-18DE-4D45-B69D-8B9B2D607255}" type="presParOf" srcId="{44EFEACD-BBCF-471F-B460-8A494E7D7354}" destId="{1C99F551-3349-4CE9-BF6E-415336B8882E}" srcOrd="8" destOrd="0" presId="urn:microsoft.com/office/officeart/2005/8/layout/target2"/>
-    <dgm:cxn modelId="{DF62FC31-2F6A-4F37-835D-FEB1C04BE338}" type="presParOf" srcId="{44EFEACD-BBCF-471F-B460-8A494E7D7354}" destId="{842BC400-830C-4668-9DDC-8BB6F7C0E0F7}" srcOrd="9" destOrd="0" presId="urn:microsoft.com/office/officeart/2005/8/layout/target2"/>
-    <dgm:cxn modelId="{7AA278A4-D773-4089-B2C0-D3980C57B896}" type="presParOf" srcId="{44EFEACD-BBCF-471F-B460-8A494E7D7354}" destId="{BD4107E8-4318-4BEC-AE3A-17A2882B7ADA}" srcOrd="10" destOrd="0" presId="urn:microsoft.com/office/officeart/2005/8/layout/target2"/>
+    <dgm:cxn modelId="{4EC159F4-BF6A-4548-9EFB-5C69DAC988B5}" type="presOf" srcId="{4FAAA736-7B35-4ED3-809D-0D2BA3B760EB}" destId="{64688F6A-3CFA-46B4-AF65-9AD28AE9C41C}" srcOrd="0" destOrd="0" presId="urn:microsoft.com/office/officeart/2005/8/layout/radial6"/>
+    <dgm:cxn modelId="{57D834F9-0362-4968-89F6-B662955BC6CC}" type="presOf" srcId="{CA427819-FB33-4E0F-8D10-BED2E9B5FE90}" destId="{B1C48636-7ABF-4FB6-8658-2DC2873F927A}" srcOrd="0" destOrd="0" presId="urn:microsoft.com/office/officeart/2005/8/layout/radial6"/>
+    <dgm:cxn modelId="{1DC6BDB6-C26A-4214-A740-36CF85B60E7C}" type="presParOf" srcId="{73486626-F990-41CF-B751-2BF8D52EFF33}" destId="{5828CD21-1A64-4409-91D1-CF2DECC09F01}" srcOrd="0" destOrd="0" presId="urn:microsoft.com/office/officeart/2005/8/layout/radial6"/>
+    <dgm:cxn modelId="{14998FC0-4732-41A7-9405-1DD787CE14C0}" type="presParOf" srcId="{73486626-F990-41CF-B751-2BF8D52EFF33}" destId="{4F643DB7-EE65-4DF5-B417-DA10D3CD6A39}" srcOrd="1" destOrd="0" presId="urn:microsoft.com/office/officeart/2005/8/layout/radial6"/>
+    <dgm:cxn modelId="{A922D7B0-8AAB-4018-BB07-596680FBCC3B}" type="presParOf" srcId="{73486626-F990-41CF-B751-2BF8D52EFF33}" destId="{81993A29-6DB6-4EEA-8FC0-91A5C1CA2F2B}" srcOrd="2" destOrd="0" presId="urn:microsoft.com/office/officeart/2005/8/layout/radial6"/>
+    <dgm:cxn modelId="{1564E674-27E9-42DB-A074-7D96E8A53AF3}" type="presParOf" srcId="{73486626-F990-41CF-B751-2BF8D52EFF33}" destId="{B68EE014-DCEC-4C45-9753-52C6B6525200}" srcOrd="3" destOrd="0" presId="urn:microsoft.com/office/officeart/2005/8/layout/radial6"/>
+    <dgm:cxn modelId="{9D26163B-5B12-4861-8D76-115705349E47}" type="presParOf" srcId="{73486626-F990-41CF-B751-2BF8D52EFF33}" destId="{D27A5CC6-601F-464A-83A2-80F163E9C832}" srcOrd="4" destOrd="0" presId="urn:microsoft.com/office/officeart/2005/8/layout/radial6"/>
+    <dgm:cxn modelId="{18ED2721-3EA7-40C9-8651-8711D33059DB}" type="presParOf" srcId="{73486626-F990-41CF-B751-2BF8D52EFF33}" destId="{535E871F-F580-45E9-A492-7DAD1DF17514}" srcOrd="5" destOrd="0" presId="urn:microsoft.com/office/officeart/2005/8/layout/radial6"/>
+    <dgm:cxn modelId="{DC6C9907-B9DB-402E-A79F-856005459F3A}" type="presParOf" srcId="{73486626-F990-41CF-B751-2BF8D52EFF33}" destId="{9E5DBB9B-5897-473C-96E3-D833F32D0843}" srcOrd="6" destOrd="0" presId="urn:microsoft.com/office/officeart/2005/8/layout/radial6"/>
+    <dgm:cxn modelId="{742F4807-423E-4E8E-8F0D-57B214DDA54F}" type="presParOf" srcId="{73486626-F990-41CF-B751-2BF8D52EFF33}" destId="{B1C48636-7ABF-4FB6-8658-2DC2873F927A}" srcOrd="7" destOrd="0" presId="urn:microsoft.com/office/officeart/2005/8/layout/radial6"/>
+    <dgm:cxn modelId="{E654BFA4-128A-47AE-8DA6-0DE9F4F81BA1}" type="presParOf" srcId="{73486626-F990-41CF-B751-2BF8D52EFF33}" destId="{FE22B466-1DA8-4609-BBD3-B72768957859}" srcOrd="8" destOrd="0" presId="urn:microsoft.com/office/officeart/2005/8/layout/radial6"/>
+    <dgm:cxn modelId="{2805E8CA-84D8-4198-A20E-9DEA44BE7C1C}" type="presParOf" srcId="{73486626-F990-41CF-B751-2BF8D52EFF33}" destId="{7E312E4B-6337-4E88-992C-060C27CE48D1}" srcOrd="9" destOrd="0" presId="urn:microsoft.com/office/officeart/2005/8/layout/radial6"/>
+    <dgm:cxn modelId="{4B7EAC97-C76B-4C6C-A6C9-054C8C09BA11}" type="presParOf" srcId="{73486626-F990-41CF-B751-2BF8D52EFF33}" destId="{BF0E52B9-D139-4673-88CA-DBA78922F7B5}" srcOrd="10" destOrd="0" presId="urn:microsoft.com/office/officeart/2005/8/layout/radial6"/>
+    <dgm:cxn modelId="{E289CFDA-4F2F-494A-BB8B-64D493E15908}" type="presParOf" srcId="{73486626-F990-41CF-B751-2BF8D52EFF33}" destId="{27220506-D456-4EBE-9C23-F6E24979E4FC}" srcOrd="11" destOrd="0" presId="urn:microsoft.com/office/officeart/2005/8/layout/radial6"/>
+    <dgm:cxn modelId="{7ED24D33-6CFB-4D43-A4B6-7FD78278CB67}" type="presParOf" srcId="{73486626-F990-41CF-B751-2BF8D52EFF33}" destId="{64688F6A-3CFA-46B4-AF65-9AD28AE9C41C}" srcOrd="12" destOrd="0" presId="urn:microsoft.com/office/officeart/2005/8/layout/radial6"/>
+    <dgm:cxn modelId="{4C082B5A-7088-4D2E-8DA7-E531C41D9176}" type="presParOf" srcId="{73486626-F990-41CF-B751-2BF8D52EFF33}" destId="{BDE57BE5-7B34-4BA1-AC25-3351D981DC7D}" srcOrd="13" destOrd="0" presId="urn:microsoft.com/office/officeart/2005/8/layout/radial6"/>
+    <dgm:cxn modelId="{84DFF3CF-088A-4E53-9BEF-4201918BD350}" type="presParOf" srcId="{73486626-F990-41CF-B751-2BF8D52EFF33}" destId="{CAC1A429-44DA-4538-806E-5DD4C4F779E8}" srcOrd="14" destOrd="0" presId="urn:microsoft.com/office/officeart/2005/8/layout/radial6"/>
+    <dgm:cxn modelId="{C28DDCD1-CA3C-4683-B02C-AE2DB21918D6}" type="presParOf" srcId="{73486626-F990-41CF-B751-2BF8D52EFF33}" destId="{73CD95A2-B381-4058-A65C-B634E03B9B7A}" srcOrd="15" destOrd="0" presId="urn:microsoft.com/office/officeart/2005/8/layout/radial6"/>
+    <dgm:cxn modelId="{923BF33D-51F5-4510-A24C-C7B408F32FD8}" type="presParOf" srcId="{73486626-F990-41CF-B751-2BF8D52EFF33}" destId="{93FE6F2E-B011-4F6E-969E-EAAA38F5D908}" srcOrd="16" destOrd="0" presId="urn:microsoft.com/office/officeart/2005/8/layout/radial6"/>
+    <dgm:cxn modelId="{47225556-4C0E-4B3A-9DCD-5E4879594FEA}" type="presParOf" srcId="{73486626-F990-41CF-B751-2BF8D52EFF33}" destId="{D4AF7D88-8A29-456B-B576-1E33E6F859A0}" srcOrd="17" destOrd="0" presId="urn:microsoft.com/office/officeart/2005/8/layout/radial6"/>
+    <dgm:cxn modelId="{FDBBE04A-D3D5-4BBA-91DF-85FCDBA6DABD}" type="presParOf" srcId="{73486626-F990-41CF-B751-2BF8D52EFF33}" destId="{4C0E6876-333E-401E-8ABB-9BFFD19E0C59}" srcOrd="18" destOrd="0" presId="urn:microsoft.com/office/officeart/2005/8/layout/radial6"/>
   </dgm:cxnLst>
   <dgm:bg/>
   <dgm:whole/>
@@ -3032,20 +3062,294 @@
       <dsp:cNvGrpSpPr/>
     </dsp:nvGrpSpPr>
     <dsp:grpSpPr/>
-    <dsp:sp modelId="{AAE40553-F7AD-465E-BE68-E44F52EBA75A}">
+    <dsp:sp modelId="{4C0E6876-333E-401E-8ABB-9BFFD19E0C59}">
       <dsp:nvSpPr>
         <dsp:cNvPr id="0" name=""/>
         <dsp:cNvSpPr/>
       </dsp:nvSpPr>
       <dsp:spPr>
         <a:xfrm>
-          <a:off x="0" y="0"/>
-          <a:ext cx="3657600" cy="2438400"/>
+          <a:off x="883450" y="273850"/>
+          <a:ext cx="1890698" cy="1890698"/>
         </a:xfrm>
-        <a:prstGeom prst="roundRect">
+        <a:prstGeom prst="blockArc">
           <a:avLst>
-            <a:gd name="adj" fmla="val 8500"/>
+            <a:gd name="adj1" fmla="val 12600000"/>
+            <a:gd name="adj2" fmla="val 16200000"/>
+            <a:gd name="adj3" fmla="val 4494"/>
           </a:avLst>
+        </a:prstGeom>
+        <a:solidFill>
+          <a:schemeClr val="dk1">
+            <a:tint val="60000"/>
+            <a:hueOff val="0"/>
+            <a:satOff val="0"/>
+            <a:lumOff val="0"/>
+            <a:alphaOff val="0"/>
+          </a:schemeClr>
+        </a:solidFill>
+        <a:ln>
+          <a:noFill/>
+        </a:ln>
+        <a:effectLst/>
+      </dsp:spPr>
+      <dsp:style>
+        <a:lnRef idx="0">
+          <a:scrgbClr r="0" g="0" b="0"/>
+        </a:lnRef>
+        <a:fillRef idx="1">
+          <a:scrgbClr r="0" g="0" b="0"/>
+        </a:fillRef>
+        <a:effectRef idx="0">
+          <a:scrgbClr r="0" g="0" b="0"/>
+        </a:effectRef>
+        <a:fontRef idx="minor">
+          <a:schemeClr val="lt1"/>
+        </a:fontRef>
+      </dsp:style>
+    </dsp:sp>
+    <dsp:sp modelId="{73CD95A2-B381-4058-A65C-B634E03B9B7A}">
+      <dsp:nvSpPr>
+        <dsp:cNvPr id="0" name=""/>
+        <dsp:cNvSpPr/>
+      </dsp:nvSpPr>
+      <dsp:spPr>
+        <a:xfrm>
+          <a:off x="883450" y="273850"/>
+          <a:ext cx="1890698" cy="1890698"/>
+        </a:xfrm>
+        <a:prstGeom prst="blockArc">
+          <a:avLst>
+            <a:gd name="adj1" fmla="val 9000000"/>
+            <a:gd name="adj2" fmla="val 12600000"/>
+            <a:gd name="adj3" fmla="val 4494"/>
+          </a:avLst>
+        </a:prstGeom>
+        <a:solidFill>
+          <a:schemeClr val="dk1">
+            <a:tint val="60000"/>
+            <a:hueOff val="0"/>
+            <a:satOff val="0"/>
+            <a:lumOff val="0"/>
+            <a:alphaOff val="0"/>
+          </a:schemeClr>
+        </a:solidFill>
+        <a:ln>
+          <a:noFill/>
+        </a:ln>
+        <a:effectLst/>
+      </dsp:spPr>
+      <dsp:style>
+        <a:lnRef idx="0">
+          <a:scrgbClr r="0" g="0" b="0"/>
+        </a:lnRef>
+        <a:fillRef idx="1">
+          <a:scrgbClr r="0" g="0" b="0"/>
+        </a:fillRef>
+        <a:effectRef idx="0">
+          <a:scrgbClr r="0" g="0" b="0"/>
+        </a:effectRef>
+        <a:fontRef idx="minor">
+          <a:schemeClr val="lt1"/>
+        </a:fontRef>
+      </dsp:style>
+    </dsp:sp>
+    <dsp:sp modelId="{64688F6A-3CFA-46B4-AF65-9AD28AE9C41C}">
+      <dsp:nvSpPr>
+        <dsp:cNvPr id="0" name=""/>
+        <dsp:cNvSpPr/>
+      </dsp:nvSpPr>
+      <dsp:spPr>
+        <a:xfrm>
+          <a:off x="883450" y="273850"/>
+          <a:ext cx="1890698" cy="1890698"/>
+        </a:xfrm>
+        <a:prstGeom prst="blockArc">
+          <a:avLst>
+            <a:gd name="adj1" fmla="val 5400000"/>
+            <a:gd name="adj2" fmla="val 9000000"/>
+            <a:gd name="adj3" fmla="val 4494"/>
+          </a:avLst>
+        </a:prstGeom>
+        <a:solidFill>
+          <a:schemeClr val="dk1">
+            <a:tint val="60000"/>
+            <a:hueOff val="0"/>
+            <a:satOff val="0"/>
+            <a:lumOff val="0"/>
+            <a:alphaOff val="0"/>
+          </a:schemeClr>
+        </a:solidFill>
+        <a:ln>
+          <a:noFill/>
+        </a:ln>
+        <a:effectLst/>
+      </dsp:spPr>
+      <dsp:style>
+        <a:lnRef idx="0">
+          <a:scrgbClr r="0" g="0" b="0"/>
+        </a:lnRef>
+        <a:fillRef idx="1">
+          <a:scrgbClr r="0" g="0" b="0"/>
+        </a:fillRef>
+        <a:effectRef idx="0">
+          <a:scrgbClr r="0" g="0" b="0"/>
+        </a:effectRef>
+        <a:fontRef idx="minor">
+          <a:schemeClr val="lt1"/>
+        </a:fontRef>
+      </dsp:style>
+    </dsp:sp>
+    <dsp:sp modelId="{7E312E4B-6337-4E88-992C-060C27CE48D1}">
+      <dsp:nvSpPr>
+        <dsp:cNvPr id="0" name=""/>
+        <dsp:cNvSpPr/>
+      </dsp:nvSpPr>
+      <dsp:spPr>
+        <a:xfrm>
+          <a:off x="883450" y="273850"/>
+          <a:ext cx="1890698" cy="1890698"/>
+        </a:xfrm>
+        <a:prstGeom prst="blockArc">
+          <a:avLst>
+            <a:gd name="adj1" fmla="val 1800000"/>
+            <a:gd name="adj2" fmla="val 5400000"/>
+            <a:gd name="adj3" fmla="val 4494"/>
+          </a:avLst>
+        </a:prstGeom>
+        <a:solidFill>
+          <a:schemeClr val="dk1">
+            <a:tint val="60000"/>
+            <a:hueOff val="0"/>
+            <a:satOff val="0"/>
+            <a:lumOff val="0"/>
+            <a:alphaOff val="0"/>
+          </a:schemeClr>
+        </a:solidFill>
+        <a:ln>
+          <a:noFill/>
+        </a:ln>
+        <a:effectLst/>
+      </dsp:spPr>
+      <dsp:style>
+        <a:lnRef idx="0">
+          <a:scrgbClr r="0" g="0" b="0"/>
+        </a:lnRef>
+        <a:fillRef idx="1">
+          <a:scrgbClr r="0" g="0" b="0"/>
+        </a:fillRef>
+        <a:effectRef idx="0">
+          <a:scrgbClr r="0" g="0" b="0"/>
+        </a:effectRef>
+        <a:fontRef idx="minor">
+          <a:schemeClr val="lt1"/>
+        </a:fontRef>
+      </dsp:style>
+    </dsp:sp>
+    <dsp:sp modelId="{9E5DBB9B-5897-473C-96E3-D833F32D0843}">
+      <dsp:nvSpPr>
+        <dsp:cNvPr id="0" name=""/>
+        <dsp:cNvSpPr/>
+      </dsp:nvSpPr>
+      <dsp:spPr>
+        <a:xfrm>
+          <a:off x="883450" y="273850"/>
+          <a:ext cx="1890698" cy="1890698"/>
+        </a:xfrm>
+        <a:prstGeom prst="blockArc">
+          <a:avLst>
+            <a:gd name="adj1" fmla="val 19800000"/>
+            <a:gd name="adj2" fmla="val 1800000"/>
+            <a:gd name="adj3" fmla="val 4494"/>
+          </a:avLst>
+        </a:prstGeom>
+        <a:solidFill>
+          <a:schemeClr val="dk1">
+            <a:tint val="60000"/>
+            <a:hueOff val="0"/>
+            <a:satOff val="0"/>
+            <a:lumOff val="0"/>
+            <a:alphaOff val="0"/>
+          </a:schemeClr>
+        </a:solidFill>
+        <a:ln>
+          <a:noFill/>
+        </a:ln>
+        <a:effectLst/>
+      </dsp:spPr>
+      <dsp:style>
+        <a:lnRef idx="0">
+          <a:scrgbClr r="0" g="0" b="0"/>
+        </a:lnRef>
+        <a:fillRef idx="1">
+          <a:scrgbClr r="0" g="0" b="0"/>
+        </a:fillRef>
+        <a:effectRef idx="0">
+          <a:scrgbClr r="0" g="0" b="0"/>
+        </a:effectRef>
+        <a:fontRef idx="minor">
+          <a:schemeClr val="lt1"/>
+        </a:fontRef>
+      </dsp:style>
+    </dsp:sp>
+    <dsp:sp modelId="{B68EE014-DCEC-4C45-9753-52C6B6525200}">
+      <dsp:nvSpPr>
+        <dsp:cNvPr id="0" name=""/>
+        <dsp:cNvSpPr/>
+      </dsp:nvSpPr>
+      <dsp:spPr>
+        <a:xfrm>
+          <a:off x="883450" y="273850"/>
+          <a:ext cx="1890698" cy="1890698"/>
+        </a:xfrm>
+        <a:prstGeom prst="blockArc">
+          <a:avLst>
+            <a:gd name="adj1" fmla="val 16200000"/>
+            <a:gd name="adj2" fmla="val 19800000"/>
+            <a:gd name="adj3" fmla="val 4494"/>
+          </a:avLst>
+        </a:prstGeom>
+        <a:solidFill>
+          <a:schemeClr val="dk1">
+            <a:tint val="60000"/>
+            <a:hueOff val="0"/>
+            <a:satOff val="0"/>
+            <a:lumOff val="0"/>
+            <a:alphaOff val="0"/>
+          </a:schemeClr>
+        </a:solidFill>
+        <a:ln>
+          <a:noFill/>
+        </a:ln>
+        <a:effectLst/>
+      </dsp:spPr>
+      <dsp:style>
+        <a:lnRef idx="0">
+          <a:scrgbClr r="0" g="0" b="0"/>
+        </a:lnRef>
+        <a:fillRef idx="1">
+          <a:scrgbClr r="0" g="0" b="0"/>
+        </a:fillRef>
+        <a:effectRef idx="0">
+          <a:scrgbClr r="0" g="0" b="0"/>
+        </a:effectRef>
+        <a:fontRef idx="minor">
+          <a:schemeClr val="lt1"/>
+        </a:fontRef>
+      </dsp:style>
+    </dsp:sp>
+    <dsp:sp modelId="{5828CD21-1A64-4409-91D1-CF2DECC09F01}">
+      <dsp:nvSpPr>
+        <dsp:cNvPr id="0" name=""/>
+        <dsp:cNvSpPr/>
+      </dsp:nvSpPr>
+      <dsp:spPr>
+        <a:xfrm>
+          <a:off x="1407318" y="797718"/>
+          <a:ext cx="842962" cy="842962"/>
+        </a:xfrm>
+        <a:prstGeom prst="ellipse">
+          <a:avLst/>
         </a:prstGeom>
         <a:solidFill>
           <a:schemeClr val="lt1">
@@ -3085,12 +3389,12 @@
         </a:fontRef>
       </dsp:style>
       <dsp:txBody>
-        <a:bodyPr spcFirstLastPara="0" vert="horz" wrap="square" lIns="171450" tIns="171450" rIns="171450" bIns="1505373" numCol="1" spcCol="1270" anchor="t" anchorCtr="0">
+        <a:bodyPr spcFirstLastPara="0" vert="horz" wrap="square" lIns="21590" tIns="21590" rIns="21590" bIns="21590" numCol="1" spcCol="1270" anchor="ctr" anchorCtr="0">
           <a:noAutofit/>
         </a:bodyPr>
         <a:lstStyle/>
         <a:p>
-          <a:pPr marL="0" lvl="0" indent="0" algn="l" defTabSz="2000250">
+          <a:pPr marL="0" lvl="0" indent="0" algn="ctr" defTabSz="755650">
             <a:lnSpc>
               <a:spcPct val="90000"/>
             </a:lnSpc>
@@ -3103,35 +3407,31 @@
             <a:buNone/>
           </a:pPr>
           <a:r>
-            <a:rPr lang="en-US" sz="4500" kern="1200" dirty="0"/>
+            <a:rPr lang="en-US" sz="1700" kern="1200" dirty="0"/>
             <a:t>Thesis</a:t>
           </a:r>
         </a:p>
       </dsp:txBody>
       <dsp:txXfrm>
-        <a:off x="60706" y="60706"/>
-        <a:ext cx="3536188" cy="2316988"/>
+        <a:off x="1530767" y="921167"/>
+        <a:ext cx="596064" cy="596064"/>
       </dsp:txXfrm>
     </dsp:sp>
-    <dsp:sp modelId="{1C1FE47E-6332-497B-AE27-AA2B02B2B0A4}">
+    <dsp:sp modelId="{4F643DB7-EE65-4DF5-B417-DA10D3CD6A39}">
       <dsp:nvSpPr>
         <dsp:cNvPr id="0" name=""/>
         <dsp:cNvSpPr/>
       </dsp:nvSpPr>
       <dsp:spPr>
         <a:xfrm>
-          <a:off x="91440" y="1097280"/>
-          <a:ext cx="570919" cy="1097280"/>
+          <a:off x="1533763" y="56"/>
+          <a:ext cx="590073" cy="590073"/>
         </a:xfrm>
-        <a:prstGeom prst="roundRect">
-          <a:avLst>
-            <a:gd name="adj" fmla="val 10500"/>
-          </a:avLst>
+        <a:prstGeom prst="ellipse">
+          <a:avLst/>
         </a:prstGeom>
         <a:solidFill>
-          <a:schemeClr val="dk1">
-            <a:alpha val="90000"/>
-            <a:tint val="40000"/>
+          <a:schemeClr val="lt1">
             <a:hueOff val="0"/>
             <a:satOff val="0"/>
             <a:lumOff val="0"/>
@@ -3141,6 +3441,7 @@
         <a:ln w="12700" cap="flat" cmpd="sng" algn="ctr">
           <a:solidFill>
             <a:schemeClr val="dk1">
+              <a:shade val="80000"/>
               <a:hueOff val="0"/>
               <a:satOff val="0"/>
               <a:lumOff val="0"/>
@@ -3162,15 +3463,17 @@
         <a:effectRef idx="0">
           <a:scrgbClr r="0" g="0" b="0"/>
         </a:effectRef>
-        <a:fontRef idx="minor"/>
+        <a:fontRef idx="minor">
+          <a:schemeClr val="lt1"/>
+        </a:fontRef>
       </dsp:style>
       <dsp:txBody>
-        <a:bodyPr spcFirstLastPara="0" vert="horz" wrap="square" lIns="22860" tIns="22860" rIns="22860" bIns="22860" numCol="1" spcCol="1270" anchor="ctr" anchorCtr="0">
+        <a:bodyPr spcFirstLastPara="0" vert="horz" wrap="square" lIns="6350" tIns="6350" rIns="6350" bIns="6350" numCol="1" spcCol="1270" anchor="ctr" anchorCtr="0">
           <a:noAutofit/>
         </a:bodyPr>
         <a:lstStyle/>
         <a:p>
-          <a:pPr marL="0" lvl="0" indent="0" algn="ctr" defTabSz="266700">
+          <a:pPr marL="0" lvl="0" indent="0" algn="ctr" defTabSz="222250">
             <a:lnSpc>
               <a:spcPct val="90000"/>
             </a:lnSpc>
@@ -3183,35 +3486,31 @@
             <a:buNone/>
           </a:pPr>
           <a:r>
-            <a:rPr lang="en-US" sz="600" kern="1200" dirty="0"/>
+            <a:rPr lang="en-US" sz="500" kern="1200" dirty="0"/>
             <a:t>Wireless Requirements</a:t>
           </a:r>
         </a:p>
       </dsp:txBody>
       <dsp:txXfrm>
-        <a:off x="108998" y="1114838"/>
-        <a:ext cx="535803" cy="1062164"/>
+        <a:off x="1620177" y="86470"/>
+        <a:ext cx="417245" cy="417245"/>
       </dsp:txXfrm>
     </dsp:sp>
-    <dsp:sp modelId="{0BDC1031-AD1A-4D79-AB74-C17488B0F667}">
+    <dsp:sp modelId="{D27A5CC6-601F-464A-83A2-80F163E9C832}">
       <dsp:nvSpPr>
         <dsp:cNvPr id="0" name=""/>
         <dsp:cNvSpPr/>
       </dsp:nvSpPr>
       <dsp:spPr>
         <a:xfrm>
-          <a:off x="671374" y="1097280"/>
-          <a:ext cx="570919" cy="1097280"/>
+          <a:off x="2334062" y="462109"/>
+          <a:ext cx="590073" cy="590073"/>
         </a:xfrm>
-        <a:prstGeom prst="roundRect">
-          <a:avLst>
-            <a:gd name="adj" fmla="val 10500"/>
-          </a:avLst>
+        <a:prstGeom prst="ellipse">
+          <a:avLst/>
         </a:prstGeom>
         <a:solidFill>
-          <a:schemeClr val="dk1">
-            <a:alpha val="90000"/>
-            <a:tint val="40000"/>
+          <a:schemeClr val="lt1">
             <a:hueOff val="0"/>
             <a:satOff val="0"/>
             <a:lumOff val="0"/>
@@ -3221,6 +3520,7 @@
         <a:ln w="12700" cap="flat" cmpd="sng" algn="ctr">
           <a:solidFill>
             <a:schemeClr val="dk1">
+              <a:shade val="80000"/>
               <a:hueOff val="0"/>
               <a:satOff val="0"/>
               <a:lumOff val="0"/>
@@ -3242,15 +3542,17 @@
         <a:effectRef idx="0">
           <a:scrgbClr r="0" g="0" b="0"/>
         </a:effectRef>
-        <a:fontRef idx="minor"/>
+        <a:fontRef idx="minor">
+          <a:schemeClr val="lt1"/>
+        </a:fontRef>
       </dsp:style>
       <dsp:txBody>
-        <a:bodyPr spcFirstLastPara="0" vert="horz" wrap="square" lIns="22860" tIns="22860" rIns="22860" bIns="22860" numCol="1" spcCol="1270" anchor="ctr" anchorCtr="0">
+        <a:bodyPr spcFirstLastPara="0" vert="horz" wrap="square" lIns="6350" tIns="6350" rIns="6350" bIns="6350" numCol="1" spcCol="1270" anchor="ctr" anchorCtr="0">
           <a:noAutofit/>
         </a:bodyPr>
         <a:lstStyle/>
         <a:p>
-          <a:pPr marL="0" lvl="0" indent="0" algn="ctr" defTabSz="266700">
+          <a:pPr marL="0" lvl="0" indent="0" algn="ctr" defTabSz="222250">
             <a:lnSpc>
               <a:spcPct val="90000"/>
             </a:lnSpc>
@@ -3263,35 +3565,31 @@
             <a:buNone/>
           </a:pPr>
           <a:r>
-            <a:rPr lang="en-US" sz="600" kern="1200" dirty="0"/>
+            <a:rPr lang="en-US" sz="500" kern="1200" dirty="0"/>
             <a:t>Architectural Modeling</a:t>
           </a:r>
         </a:p>
       </dsp:txBody>
       <dsp:txXfrm>
-        <a:off x="688932" y="1114838"/>
-        <a:ext cx="535803" cy="1062164"/>
+        <a:off x="2420476" y="548523"/>
+        <a:ext cx="417245" cy="417245"/>
       </dsp:txXfrm>
     </dsp:sp>
-    <dsp:sp modelId="{B2EB2BAD-E656-4C56-AF49-D0FA9B44C748}">
+    <dsp:sp modelId="{B1C48636-7ABF-4FB6-8658-2DC2873F927A}">
       <dsp:nvSpPr>
         <dsp:cNvPr id="0" name=""/>
         <dsp:cNvSpPr/>
       </dsp:nvSpPr>
       <dsp:spPr>
         <a:xfrm>
-          <a:off x="1251308" y="1097280"/>
-          <a:ext cx="570919" cy="1097280"/>
+          <a:off x="2334062" y="1386216"/>
+          <a:ext cx="590073" cy="590073"/>
         </a:xfrm>
-        <a:prstGeom prst="roundRect">
-          <a:avLst>
-            <a:gd name="adj" fmla="val 10500"/>
-          </a:avLst>
+        <a:prstGeom prst="ellipse">
+          <a:avLst/>
         </a:prstGeom>
         <a:solidFill>
-          <a:schemeClr val="dk1">
-            <a:alpha val="90000"/>
-            <a:tint val="40000"/>
+          <a:schemeClr val="lt1">
             <a:hueOff val="0"/>
             <a:satOff val="0"/>
             <a:lumOff val="0"/>
@@ -3301,6 +3599,7 @@
         <a:ln w="12700" cap="flat" cmpd="sng" algn="ctr">
           <a:solidFill>
             <a:schemeClr val="dk1">
+              <a:shade val="80000"/>
               <a:hueOff val="0"/>
               <a:satOff val="0"/>
               <a:lumOff val="0"/>
@@ -3322,15 +3621,17 @@
         <a:effectRef idx="0">
           <a:scrgbClr r="0" g="0" b="0"/>
         </a:effectRef>
-        <a:fontRef idx="minor"/>
+        <a:fontRef idx="minor">
+          <a:schemeClr val="lt1"/>
+        </a:fontRef>
       </dsp:style>
       <dsp:txBody>
-        <a:bodyPr spcFirstLastPara="0" vert="horz" wrap="square" lIns="22860" tIns="22860" rIns="22860" bIns="22860" numCol="1" spcCol="1270" anchor="ctr" anchorCtr="0">
+        <a:bodyPr spcFirstLastPara="0" vert="horz" wrap="square" lIns="6350" tIns="6350" rIns="6350" bIns="6350" numCol="1" spcCol="1270" anchor="ctr" anchorCtr="0">
           <a:noAutofit/>
         </a:bodyPr>
         <a:lstStyle/>
         <a:p>
-          <a:pPr marL="0" lvl="0" indent="0" algn="ctr" defTabSz="266700">
+          <a:pPr marL="0" lvl="0" indent="0" algn="ctr" defTabSz="222250">
             <a:lnSpc>
               <a:spcPct val="90000"/>
             </a:lnSpc>
@@ -3343,35 +3644,31 @@
             <a:buNone/>
           </a:pPr>
           <a:r>
-            <a:rPr lang="en-US" sz="600" kern="1200" dirty="0"/>
+            <a:rPr lang="en-US" sz="500" kern="1200" dirty="0"/>
             <a:t>Testbed Development</a:t>
           </a:r>
         </a:p>
       </dsp:txBody>
       <dsp:txXfrm>
-        <a:off x="1268866" y="1114838"/>
-        <a:ext cx="535803" cy="1062164"/>
+        <a:off x="2420476" y="1472630"/>
+        <a:ext cx="417245" cy="417245"/>
       </dsp:txXfrm>
     </dsp:sp>
-    <dsp:sp modelId="{D6B94978-CBF6-49A3-87AD-9F6B2E28C34A}">
+    <dsp:sp modelId="{BF0E52B9-D139-4673-88CA-DBA78922F7B5}">
       <dsp:nvSpPr>
         <dsp:cNvPr id="0" name=""/>
         <dsp:cNvSpPr/>
       </dsp:nvSpPr>
       <dsp:spPr>
         <a:xfrm>
-          <a:off x="1831242" y="1097280"/>
-          <a:ext cx="570919" cy="1097280"/>
+          <a:off x="1533763" y="1848269"/>
+          <a:ext cx="590073" cy="590073"/>
         </a:xfrm>
-        <a:prstGeom prst="roundRect">
-          <a:avLst>
-            <a:gd name="adj" fmla="val 10500"/>
-          </a:avLst>
+        <a:prstGeom prst="ellipse">
+          <a:avLst/>
         </a:prstGeom>
         <a:solidFill>
-          <a:schemeClr val="dk1">
-            <a:alpha val="90000"/>
-            <a:tint val="40000"/>
+          <a:schemeClr val="lt1">
             <a:hueOff val="0"/>
             <a:satOff val="0"/>
             <a:lumOff val="0"/>
@@ -3381,6 +3678,7 @@
         <a:ln w="12700" cap="flat" cmpd="sng" algn="ctr">
           <a:solidFill>
             <a:schemeClr val="dk1">
+              <a:shade val="80000"/>
               <a:hueOff val="0"/>
               <a:satOff val="0"/>
               <a:lumOff val="0"/>
@@ -3402,15 +3700,17 @@
         <a:effectRef idx="0">
           <a:scrgbClr r="0" g="0" b="0"/>
         </a:effectRef>
-        <a:fontRef idx="minor"/>
+        <a:fontRef idx="minor">
+          <a:schemeClr val="lt1"/>
+        </a:fontRef>
       </dsp:style>
       <dsp:txBody>
-        <a:bodyPr spcFirstLastPara="0" vert="horz" wrap="square" lIns="22860" tIns="22860" rIns="22860" bIns="22860" numCol="1" spcCol="1270" anchor="ctr" anchorCtr="0">
+        <a:bodyPr spcFirstLastPara="0" vert="horz" wrap="square" lIns="6350" tIns="6350" rIns="6350" bIns="6350" numCol="1" spcCol="1270" anchor="ctr" anchorCtr="0">
           <a:noAutofit/>
         </a:bodyPr>
         <a:lstStyle/>
         <a:p>
-          <a:pPr marL="0" lvl="0" indent="0" algn="ctr" defTabSz="266700">
+          <a:pPr marL="0" lvl="0" indent="0" algn="ctr" defTabSz="222250">
             <a:lnSpc>
               <a:spcPct val="90000"/>
             </a:lnSpc>
@@ -3423,35 +3723,31 @@
             <a:buNone/>
           </a:pPr>
           <a:r>
-            <a:rPr lang="en-US" sz="600" kern="1200" dirty="0"/>
+            <a:rPr lang="en-US" sz="500" kern="1200" dirty="0"/>
             <a:t>Data Collection and Organization</a:t>
           </a:r>
         </a:p>
       </dsp:txBody>
       <dsp:txXfrm>
-        <a:off x="1848800" y="1114838"/>
-        <a:ext cx="535803" cy="1062164"/>
+        <a:off x="1620177" y="1934683"/>
+        <a:ext cx="417245" cy="417245"/>
       </dsp:txXfrm>
     </dsp:sp>
-    <dsp:sp modelId="{1C99F551-3349-4CE9-BF6E-415336B8882E}">
+    <dsp:sp modelId="{BDE57BE5-7B34-4BA1-AC25-3351D981DC7D}">
       <dsp:nvSpPr>
         <dsp:cNvPr id="0" name=""/>
         <dsp:cNvSpPr/>
       </dsp:nvSpPr>
       <dsp:spPr>
         <a:xfrm>
-          <a:off x="2411176" y="1097280"/>
-          <a:ext cx="570919" cy="1097280"/>
+          <a:off x="733463" y="1386216"/>
+          <a:ext cx="590073" cy="590073"/>
         </a:xfrm>
-        <a:prstGeom prst="roundRect">
-          <a:avLst>
-            <a:gd name="adj" fmla="val 10500"/>
-          </a:avLst>
+        <a:prstGeom prst="ellipse">
+          <a:avLst/>
         </a:prstGeom>
         <a:solidFill>
-          <a:schemeClr val="dk1">
-            <a:alpha val="90000"/>
-            <a:tint val="40000"/>
+          <a:schemeClr val="lt1">
             <a:hueOff val="0"/>
             <a:satOff val="0"/>
             <a:lumOff val="0"/>
@@ -3461,6 +3757,7 @@
         <a:ln w="12700" cap="flat" cmpd="sng" algn="ctr">
           <a:solidFill>
             <a:schemeClr val="dk1">
+              <a:shade val="80000"/>
               <a:hueOff val="0"/>
               <a:satOff val="0"/>
               <a:lumOff val="0"/>
@@ -3482,15 +3779,17 @@
         <a:effectRef idx="0">
           <a:scrgbClr r="0" g="0" b="0"/>
         </a:effectRef>
-        <a:fontRef idx="minor"/>
+        <a:fontRef idx="minor">
+          <a:schemeClr val="lt1"/>
+        </a:fontRef>
       </dsp:style>
       <dsp:txBody>
-        <a:bodyPr spcFirstLastPara="0" vert="horz" wrap="square" lIns="22860" tIns="22860" rIns="22860" bIns="22860" numCol="1" spcCol="1270" anchor="ctr" anchorCtr="0">
+        <a:bodyPr spcFirstLastPara="0" vert="horz" wrap="square" lIns="6350" tIns="6350" rIns="6350" bIns="6350" numCol="1" spcCol="1270" anchor="ctr" anchorCtr="0">
           <a:noAutofit/>
         </a:bodyPr>
         <a:lstStyle/>
         <a:p>
-          <a:pPr marL="0" lvl="0" indent="0" algn="ctr" defTabSz="266700">
+          <a:pPr marL="0" lvl="0" indent="0" algn="ctr" defTabSz="222250">
             <a:lnSpc>
               <a:spcPct val="90000"/>
             </a:lnSpc>
@@ -3503,35 +3802,31 @@
             <a:buNone/>
           </a:pPr>
           <a:r>
-            <a:rPr lang="en-US" sz="600" kern="1200" dirty="0"/>
+            <a:rPr lang="en-US" sz="500" kern="1200" dirty="0"/>
             <a:t>Machine Learning</a:t>
           </a:r>
         </a:p>
       </dsp:txBody>
       <dsp:txXfrm>
-        <a:off x="2428734" y="1114838"/>
-        <a:ext cx="535803" cy="1062164"/>
+        <a:off x="819877" y="1472630"/>
+        <a:ext cx="417245" cy="417245"/>
       </dsp:txXfrm>
     </dsp:sp>
-    <dsp:sp modelId="{BD4107E8-4318-4BEC-AE3A-17A2882B7ADA}">
+    <dsp:sp modelId="{93FE6F2E-B011-4F6E-969E-EAAA38F5D908}">
       <dsp:nvSpPr>
         <dsp:cNvPr id="0" name=""/>
         <dsp:cNvSpPr/>
       </dsp:nvSpPr>
       <dsp:spPr>
         <a:xfrm>
-          <a:off x="2991110" y="1097280"/>
-          <a:ext cx="570919" cy="1097280"/>
+          <a:off x="733463" y="462109"/>
+          <a:ext cx="590073" cy="590073"/>
         </a:xfrm>
-        <a:prstGeom prst="roundRect">
-          <a:avLst>
-            <a:gd name="adj" fmla="val 10500"/>
-          </a:avLst>
+        <a:prstGeom prst="ellipse">
+          <a:avLst/>
         </a:prstGeom>
         <a:solidFill>
-          <a:schemeClr val="dk1">
-            <a:alpha val="90000"/>
-            <a:tint val="40000"/>
+          <a:schemeClr val="lt1">
             <a:hueOff val="0"/>
             <a:satOff val="0"/>
             <a:lumOff val="0"/>
@@ -3541,6 +3836,7 @@
         <a:ln w="12700" cap="flat" cmpd="sng" algn="ctr">
           <a:solidFill>
             <a:schemeClr val="dk1">
+              <a:shade val="80000"/>
               <a:hueOff val="0"/>
               <a:satOff val="0"/>
               <a:lumOff val="0"/>
@@ -3562,15 +3858,17 @@
         <a:effectRef idx="0">
           <a:scrgbClr r="0" g="0" b="0"/>
         </a:effectRef>
-        <a:fontRef idx="minor"/>
+        <a:fontRef idx="minor">
+          <a:schemeClr val="lt1"/>
+        </a:fontRef>
       </dsp:style>
       <dsp:txBody>
-        <a:bodyPr spcFirstLastPara="0" vert="horz" wrap="square" lIns="22860" tIns="22860" rIns="22860" bIns="22860" numCol="1" spcCol="1270" anchor="ctr" anchorCtr="0">
+        <a:bodyPr spcFirstLastPara="0" vert="horz" wrap="square" lIns="6350" tIns="6350" rIns="6350" bIns="6350" numCol="1" spcCol="1270" anchor="ctr" anchorCtr="0">
           <a:noAutofit/>
         </a:bodyPr>
         <a:lstStyle/>
         <a:p>
-          <a:pPr marL="0" lvl="0" indent="0" algn="ctr" defTabSz="266700">
+          <a:pPr marL="0" lvl="0" indent="0" algn="ctr" defTabSz="222250">
             <a:lnSpc>
               <a:spcPct val="90000"/>
             </a:lnSpc>
@@ -3583,14 +3881,14 @@
             <a:buNone/>
           </a:pPr>
           <a:r>
-            <a:rPr lang="en-US" sz="600" kern="1200" dirty="0"/>
+            <a:rPr lang="en-US" sz="500" kern="1200" dirty="0"/>
             <a:t>Future Research</a:t>
           </a:r>
         </a:p>
       </dsp:txBody>
       <dsp:txXfrm>
-        <a:off x="3008668" y="1114838"/>
-        <a:ext cx="535803" cy="1062164"/>
+        <a:off x="819877" y="548523"/>
+        <a:ext cx="417245" cy="417245"/>
       </dsp:txXfrm>
     </dsp:sp>
   </dsp:spTree>
@@ -4686,11 +4984,12 @@
 </file>
 
 <file path=ppt/diagrams/layout1.xml><?xml version="1.0" encoding="utf-8"?>
-<dgm:layoutDef xmlns:dgm="http://schemas.openxmlformats.org/drawingml/2006/diagram" xmlns:a="http://schemas.openxmlformats.org/drawingml/2006/main" uniqueId="urn:microsoft.com/office/officeart/2005/8/layout/target2">
+<dgm:layoutDef xmlns:dgm="http://schemas.openxmlformats.org/drawingml/2006/diagram" xmlns:a="http://schemas.openxmlformats.org/drawingml/2006/main" uniqueId="urn:microsoft.com/office/officeart/2005/8/layout/radial6">
   <dgm:title val=""/>
   <dgm:desc val=""/>
   <dgm:catLst>
-    <dgm:cat type="relationship" pri="12000"/>
+    <dgm:cat type="cycle" pri="9000"/>
+    <dgm:cat type="relationship" pri="21000"/>
   </dgm:catLst>
   <dgm:sampData>
     <dgm:dataModel>
@@ -4705,35 +5004,19 @@
         <dgm:pt modelId="12">
           <dgm:prSet phldr="1"/>
         </dgm:pt>
-        <dgm:pt modelId="2">
+        <dgm:pt modelId="13">
           <dgm:prSet phldr="1"/>
         </dgm:pt>
-        <dgm:pt modelId="21">
-          <dgm:prSet phldr="1"/>
-        </dgm:pt>
-        <dgm:pt modelId="22">
-          <dgm:prSet phldr="1"/>
-        </dgm:pt>
-        <dgm:pt modelId="3">
-          <dgm:prSet phldr="1"/>
-        </dgm:pt>
-        <dgm:pt modelId="31">
-          <dgm:prSet phldr="1"/>
-        </dgm:pt>
-        <dgm:pt modelId="32">
+        <dgm:pt modelId="14">
           <dgm:prSet phldr="1"/>
         </dgm:pt>
       </dgm:ptLst>
       <dgm:cxnLst>
-        <dgm:cxn modelId="4" srcId="0" destId="1" srcOrd="0" destOrd="0"/>
-        <dgm:cxn modelId="5" srcId="0" destId="2" srcOrd="1" destOrd="0"/>
-        <dgm:cxn modelId="6" srcId="0" destId="3" srcOrd="2" destOrd="0"/>
-        <dgm:cxn modelId="13" srcId="1" destId="11" srcOrd="0" destOrd="0"/>
-        <dgm:cxn modelId="14" srcId="1" destId="12" srcOrd="1" destOrd="0"/>
-        <dgm:cxn modelId="23" srcId="2" destId="21" srcOrd="0" destOrd="0"/>
-        <dgm:cxn modelId="24" srcId="2" destId="22" srcOrd="1" destOrd="0"/>
-        <dgm:cxn modelId="33" srcId="3" destId="31" srcOrd="0" destOrd="0"/>
-        <dgm:cxn modelId="34" srcId="3" destId="32" srcOrd="1" destOrd="0"/>
+        <dgm:cxn modelId="2" srcId="0" destId="1" srcOrd="0" destOrd="0"/>
+        <dgm:cxn modelId="3" srcId="1" destId="11" srcOrd="0" destOrd="0"/>
+        <dgm:cxn modelId="4" srcId="1" destId="12" srcOrd="1" destOrd="0"/>
+        <dgm:cxn modelId="5" srcId="1" destId="13" srcOrd="2" destOrd="0"/>
+        <dgm:cxn modelId="6" srcId="1" destId="14" srcOrd="3" destOrd="0"/>
       </dgm:cxnLst>
       <dgm:bg/>
       <dgm:whole/>
@@ -4745,14 +5028,14 @@
         <dgm:pt modelId="0" type="doc"/>
         <dgm:pt modelId="1"/>
         <dgm:pt modelId="11"/>
-        <dgm:pt modelId="2"/>
-        <dgm:pt modelId="21"/>
+        <dgm:pt modelId="12"/>
+        <dgm:pt modelId="13"/>
       </dgm:ptLst>
       <dgm:cxnLst>
-        <dgm:cxn modelId="4" srcId="0" destId="1" srcOrd="0" destOrd="0"/>
-        <dgm:cxn modelId="5" srcId="0" destId="2" srcOrd="1" destOrd="0"/>
-        <dgm:cxn modelId="13" srcId="1" destId="11" srcOrd="0" destOrd="0"/>
-        <dgm:cxn modelId="23" srcId="2" destId="21" srcOrd="0" destOrd="0"/>
+        <dgm:cxn modelId="2" srcId="0" destId="1" srcOrd="0" destOrd="0"/>
+        <dgm:cxn modelId="15" srcId="1" destId="11" srcOrd="0" destOrd="0"/>
+        <dgm:cxn modelId="16" srcId="1" destId="12" srcOrd="1" destOrd="0"/>
+        <dgm:cxn modelId="17" srcId="1" destId="13" srcOrd="2" destOrd="0"/>
       </dgm:cxnLst>
       <dgm:bg/>
       <dgm:whole/>
@@ -4764,22 +5047,20 @@
         <dgm:pt modelId="0" type="doc"/>
         <dgm:pt modelId="1"/>
         <dgm:pt modelId="11"/>
-        <dgm:pt modelId="2"/>
-        <dgm:pt modelId="21"/>
-        <dgm:pt modelId="3"/>
-        <dgm:pt modelId="31"/>
-        <dgm:pt modelId="4"/>
-        <dgm:pt modelId="41"/>
+        <dgm:pt modelId="12"/>
+        <dgm:pt modelId="13"/>
+        <dgm:pt modelId="14"/>
+        <dgm:pt modelId="15"/>
+        <dgm:pt modelId="16"/>
       </dgm:ptLst>
       <dgm:cxnLst>
-        <dgm:cxn modelId="5" srcId="0" destId="1" srcOrd="0" destOrd="0"/>
-        <dgm:cxn modelId="6" srcId="0" destId="2" srcOrd="1" destOrd="0"/>
-        <dgm:cxn modelId="7" srcId="0" destId="3" srcOrd="2" destOrd="0"/>
-        <dgm:cxn modelId="8" srcId="0" destId="4" srcOrd="3" destOrd="0"/>
-        <dgm:cxn modelId="13" srcId="1" destId="11" srcOrd="0" destOrd="0"/>
-        <dgm:cxn modelId="23" srcId="2" destId="21" srcOrd="0" destOrd="0"/>
-        <dgm:cxn modelId="33" srcId="3" destId="31" srcOrd="0" destOrd="0"/>
-        <dgm:cxn modelId="43" srcId="4" destId="41" srcOrd="0" destOrd="0"/>
+        <dgm:cxn modelId="2" srcId="0" destId="1" srcOrd="0" destOrd="0"/>
+        <dgm:cxn modelId="16" srcId="1" destId="11" srcOrd="0" destOrd="0"/>
+        <dgm:cxn modelId="17" srcId="1" destId="12" srcOrd="1" destOrd="0"/>
+        <dgm:cxn modelId="18" srcId="1" destId="13" srcOrd="2" destOrd="0"/>
+        <dgm:cxn modelId="19" srcId="1" destId="14" srcOrd="3" destOrd="0"/>
+        <dgm:cxn modelId="20" srcId="1" destId="15" srcOrd="4" destOrd="0"/>
+        <dgm:cxn modelId="21" srcId="1" destId="16" srcOrd="5" destOrd="0"/>
       </dgm:cxnLst>
       <dgm:bg/>
       <dgm:whole/>
@@ -4787,682 +5068,324 @@
   </dgm:clrData>
   <dgm:layoutNode name="Name0">
     <dgm:varLst>
-      <dgm:chMax val="3"/>
-      <dgm:chPref val="1"/>
+      <dgm:chMax val="1"/>
       <dgm:dir/>
-      <dgm:animLvl val="lvl"/>
-      <dgm:resizeHandles/>
+      <dgm:animLvl val="ctr"/>
+      <dgm:resizeHandles val="exact"/>
     </dgm:varLst>
-    <dgm:alg type="composite">
-      <dgm:param type="horzAlign" val="none"/>
-      <dgm:param type="vertAlign" val="none"/>
-    </dgm:alg>
+    <dgm:choose name="Name1">
+      <dgm:if name="Name2" func="var" arg="dir" op="equ" val="norm">
+        <dgm:choose name="Name3">
+          <dgm:if name="Name4" axis="ch ch" ptType="node node" st="1 1" cnt="1 0" func="cnt" op="lte" val="1">
+            <dgm:alg type="cycle">
+              <dgm:param type="stAng" val="90"/>
+              <dgm:param type="spanAng" val="360"/>
+              <dgm:param type="ctrShpMap" val="fNode"/>
+            </dgm:alg>
+          </dgm:if>
+          <dgm:else name="Name5">
+            <dgm:alg type="cycle">
+              <dgm:param type="stAng" val="0"/>
+              <dgm:param type="spanAng" val="360"/>
+              <dgm:param type="ctrShpMap" val="fNode"/>
+            </dgm:alg>
+          </dgm:else>
+        </dgm:choose>
+      </dgm:if>
+      <dgm:else name="Name6">
+        <dgm:choose name="Name7">
+          <dgm:if name="Name8" axis="ch ch" ptType="node node" st="1 1" cnt="1 0" func="cnt" op="lte" val="1">
+            <dgm:alg type="cycle">
+              <dgm:param type="stAng" val="-90"/>
+              <dgm:param type="spanAng" val="360"/>
+              <dgm:param type="ctrShpMap" val="fNode"/>
+            </dgm:alg>
+          </dgm:if>
+          <dgm:else name="Name9">
+            <dgm:alg type="cycle">
+              <dgm:param type="stAng" val="0"/>
+              <dgm:param type="spanAng" val="-360"/>
+              <dgm:param type="ctrShpMap" val="fNode"/>
+            </dgm:alg>
+          </dgm:else>
+        </dgm:choose>
+      </dgm:else>
+    </dgm:choose>
     <dgm:shape xmlns:r="http://schemas.openxmlformats.org/officeDocument/2006/relationships" r:blip="">
       <dgm:adjLst/>
     </dgm:shape>
     <dgm:presOf/>
-    <dgm:choose name="Name1">
-      <dgm:if name="Name2" func="var" arg="dir" op="equ" val="norm">
-        <dgm:choose name="Name3">
-          <dgm:if name="Name4" axis="ch ch" ptType="node node" st="1 1" cnt="1 0" func="cnt" op="gt" val="0">
-            <dgm:choose name="Name5">
-              <dgm:if name="Name6" axis="ch ch" ptType="node node" st="2 1" cnt="1 0" func="cnt" op="gt" val="0">
-                <dgm:constrLst>
-                  <dgm:constr type="primFontSz" for="des" forName="middleBoxParent" val="65"/>
-                  <dgm:constr type="primFontSz" for="des" forName="mChild" val="65"/>
-                  <dgm:constr type="primFontSz" for="des" forName="outerBoxParent" refType="primFontSz" refFor="des" refForName="middleBoxParent" op="equ"/>
-                  <dgm:constr type="primFontSz" for="des" forName="centerBoxParent" refType="primFontSz" refFor="des" refForName="middleBoxParent" op="equ"/>
-                  <dgm:constr type="primFontSz" for="des" forName="oChild" refType="primFontSz" refFor="des" refForName="mChild" op="equ"/>
-                  <dgm:constr type="primFontSz" for="des" forName="cChild" refType="primFontSz" refFor="des" refForName="mChild" op="equ"/>
-                  <dgm:constr type="l" for="ch" forName="outerBox"/>
-                  <dgm:constr type="t" for="ch" forName="outerBox"/>
-                  <dgm:constr type="w" for="ch" forName="outerBox" refType="w"/>
-                  <dgm:constr type="h" for="ch" forName="outerBox" refType="h"/>
-                  <dgm:constr type="l" for="ch" forName="middleBox" refType="w" fact="0.2"/>
-                  <dgm:constr type="t" for="ch" forName="middleBox" refType="h" fact="0.25"/>
-                  <dgm:constr type="w" for="ch" forName="middleBox" refType="w" fact="0.775"/>
-                  <dgm:constr type="h" for="ch" forName="middleBox" refType="h" fact="0.7"/>
-                  <dgm:constr type="l" for="ch" forName="centerBox" refType="w" fact="0.395"/>
-                  <dgm:constr type="t" for="ch" forName="centerBox" refType="h" fact="0.5"/>
-                  <dgm:constr type="w" for="ch" forName="centerBox" refType="w" fact="0.555"/>
-                  <dgm:constr type="h" for="ch" forName="centerBox" refType="h" fact="0.4"/>
-                  <dgm:constr type="userA" for="des" forName="outerSibTrans" refType="w"/>
-                  <dgm:constr type="userA" for="des" forName="middleSibTrans" refType="w"/>
-                  <dgm:constr type="userA" for="des" forName="centerSibTrans" refType="w"/>
-                </dgm:constrLst>
-              </dgm:if>
-              <dgm:else name="Name7">
-                <dgm:constrLst>
-                  <dgm:constr type="primFontSz" for="des" forName="middleBoxParent" val="65"/>
-                  <dgm:constr type="primFontSz" for="des" forName="mChild" val="65"/>
-                  <dgm:constr type="primFontSz" for="des" forName="outerBoxParent" refType="primFontSz" refFor="des" refForName="middleBoxParent" op="equ"/>
-                  <dgm:constr type="primFontSz" for="des" forName="centerBoxParent" refType="primFontSz" refFor="des" refForName="middleBoxParent" op="equ"/>
-                  <dgm:constr type="primFontSz" for="des" forName="oChild" refType="primFontSz" refFor="des" refForName="mChild" op="equ"/>
-                  <dgm:constr type="primFontSz" for="des" forName="cChild" refType="primFontSz" refFor="des" refForName="mChild" op="equ"/>
-                  <dgm:constr type="l" for="ch" forName="outerBox"/>
-                  <dgm:constr type="t" for="ch" forName="outerBox"/>
-                  <dgm:constr type="w" for="ch" forName="outerBox" refType="w"/>
-                  <dgm:constr type="h" for="ch" forName="outerBox" refType="h"/>
-                  <dgm:constr type="l" for="ch" forName="middleBox" refType="w" fact="0.2"/>
-                  <dgm:constr type="t" for="ch" forName="middleBox" refType="h" fact="0.25"/>
-                  <dgm:constr type="w" for="ch" forName="middleBox" refType="w" fact="0.775"/>
-                  <dgm:constr type="h" for="ch" forName="middleBox" refType="h" fact="0.7"/>
-                  <dgm:constr type="l" for="ch" forName="centerBox" refType="w" fact="0.225"/>
-                  <dgm:constr type="t" for="ch" forName="centerBox" refType="h" fact="0.5"/>
-                  <dgm:constr type="w" for="ch" forName="centerBox" refType="w" fact="0.725"/>
-                  <dgm:constr type="h" for="ch" forName="centerBox" refType="h" fact="0.4"/>
-                  <dgm:constr type="userA" for="des" forName="outerSibTrans" refType="w"/>
-                  <dgm:constr type="userA" for="des" forName="middleSibTrans" refType="w"/>
-                  <dgm:constr type="userA" for="des" forName="centerSibTrans" refType="w"/>
-                </dgm:constrLst>
-              </dgm:else>
-            </dgm:choose>
+    <dgm:choose name="Name10">
+      <dgm:if name="Name11" func="var" arg="dir" op="equ" val="norm">
+        <dgm:choose name="Name12">
+          <dgm:if name="Name13" axis="ch ch" ptType="node node" st="1 1" cnt="1 0" func="cnt" op="equ" val="1">
+            <dgm:constrLst>
+              <dgm:constr type="diam" val="170"/>
+              <dgm:constr type="w" for="ch" forName="centerShape" refType="w"/>
+              <dgm:constr type="w" for="ch" forName="oneComp" refType="w" refFor="ch" refForName="centerShape" op="equ" fact="0.7"/>
+              <dgm:constr type="sp" refType="w" refFor="ch" refForName="oneComp" fact="0.3"/>
+              <dgm:constr type="sibSp" refType="w" refFor="ch" refForName="oneComp" fact="0.3"/>
+              <dgm:constr type="primFontSz" for="ch" forName="centerShape" val="65"/>
+              <dgm:constr type="primFontSz" for="des" forName="oneNode" refType="primFontSz" refFor="ch" refForName="centerShape" fact="0.95"/>
+              <dgm:constr type="primFontSz" for="des" forName="oneNode" refType="primFontSz" refFor="ch" refForName="centerShape" op="lte" fact="0.95"/>
+              <dgm:constr type="diam" for="ch" forName="singleconn" refType="diam" op="equ" fact="-1"/>
+              <dgm:constr type="h" for="ch" forName="singleconn" refType="w" refFor="ch" refForName="oneComp" fact="0.24"/>
+              <dgm:constr type="w" for="ch" forName="dummya" refType="w" refFor="ch" refForName="oneComp" op="equ"/>
+              <dgm:constr type="w" for="ch" forName="dummyb" refType="w" refFor="ch" refForName="oneComp" op="equ"/>
+              <dgm:constr type="w" for="ch" forName="dummyc" refType="w" refFor="ch" refForName="oneComp" op="equ"/>
+            </dgm:constrLst>
           </dgm:if>
-          <dgm:else name="Name8">
-            <dgm:choose name="Name9">
-              <dgm:if name="Name10" axis="ch ch" ptType="node node" st="2 1" cnt="1 0" func="cnt" op="gt" val="0">
-                <dgm:constrLst>
-                  <dgm:constr type="primFontSz" for="des" forName="middleBoxParent" val="65"/>
-                  <dgm:constr type="primFontSz" for="des" forName="mChild" val="65"/>
-                  <dgm:constr type="primFontSz" for="des" forName="outerBoxParent" refType="primFontSz" refFor="des" refForName="middleBoxParent" op="equ"/>
-                  <dgm:constr type="primFontSz" for="des" forName="centerBoxParent" refType="primFontSz" refFor="des" refForName="middleBoxParent" op="equ"/>
-                  <dgm:constr type="primFontSz" for="des" forName="oChild" refType="primFontSz" refFor="des" refForName="mChild" op="equ"/>
-                  <dgm:constr type="primFontSz" for="des" forName="cChild" refType="primFontSz" refFor="des" refForName="mChild" op="equ"/>
-                  <dgm:constr type="l" for="ch" forName="outerBox"/>
-                  <dgm:constr type="t" for="ch" forName="outerBox"/>
-                  <dgm:constr type="w" for="ch" forName="outerBox" refType="w"/>
-                  <dgm:constr type="h" for="ch" forName="outerBox" refType="h"/>
-                  <dgm:constr type="l" for="ch" forName="middleBox" refType="w" fact="0.025"/>
-                  <dgm:constr type="t" for="ch" forName="middleBox" refType="h" fact="0.25"/>
-                  <dgm:constr type="w" for="ch" forName="middleBox" refType="w" fact="0.95"/>
-                  <dgm:constr type="h" for="ch" forName="middleBox" refType="h" fact="0.7"/>
-                  <dgm:constr type="l" for="ch" forName="centerBox" refType="w" fact="0.26"/>
-                  <dgm:constr type="t" for="ch" forName="centerBox" refType="h" fact="0.5"/>
-                  <dgm:constr type="w" for="ch" forName="centerBox" refType="w" fact="0.69"/>
-                  <dgm:constr type="h" for="ch" forName="centerBox" refType="h" fact="0.4"/>
-                  <dgm:constr type="userA" for="des" forName="outerSibTrans" refType="w"/>
-                  <dgm:constr type="userA" for="des" forName="middleSibTrans" refType="w"/>
-                  <dgm:constr type="userA" for="des" forName="centerSibTrans" refType="w"/>
-                </dgm:constrLst>
-              </dgm:if>
-              <dgm:else name="Name11">
-                <dgm:constrLst>
-                  <dgm:constr type="primFontSz" for="des" forName="middleBoxParent" val="65"/>
-                  <dgm:constr type="primFontSz" for="des" forName="mChild" val="65"/>
-                  <dgm:constr type="primFontSz" for="des" forName="outerBoxParent" refType="primFontSz" refFor="des" refForName="middleBoxParent" op="equ"/>
-                  <dgm:constr type="primFontSz" for="des" forName="centerBoxParent" refType="primFontSz" refFor="des" refForName="middleBoxParent" op="equ"/>
-                  <dgm:constr type="primFontSz" for="des" forName="oChild" refType="primFontSz" refFor="des" refForName="mChild" op="equ"/>
-                  <dgm:constr type="primFontSz" for="des" forName="cChild" refType="primFontSz" refFor="des" refForName="mChild" op="equ"/>
-                  <dgm:constr type="l" for="ch" forName="outerBox"/>
-                  <dgm:constr type="t" for="ch" forName="outerBox"/>
-                  <dgm:constr type="w" for="ch" forName="outerBox" refType="w"/>
-                  <dgm:constr type="h" for="ch" forName="outerBox" refType="h"/>
-                  <dgm:constr type="l" for="ch" forName="middleBox" refType="w" fact="0.025"/>
-                  <dgm:constr type="t" for="ch" forName="middleBox" refType="h" fact="0.25"/>
-                  <dgm:constr type="w" for="ch" forName="middleBox" refType="w" fact="0.95"/>
-                  <dgm:constr type="h" for="ch" forName="middleBox" refType="h" fact="0.7"/>
-                  <dgm:constr type="l" for="ch" forName="centerBox" refType="w" fact="0.05"/>
-                  <dgm:constr type="t" for="ch" forName="centerBox" refType="h" fact="0.5"/>
-                  <dgm:constr type="w" for="ch" forName="centerBox" refType="w" fact="0.9"/>
-                  <dgm:constr type="h" for="ch" forName="centerBox" refType="h" fact="0.4"/>
-                  <dgm:constr type="userA" for="des" forName="outerSibTrans" refType="w"/>
-                  <dgm:constr type="userA" for="des" forName="middleSibTrans" refType="w"/>
-                  <dgm:constr type="userA" for="des" forName="centerSibTrans" refType="w"/>
-                </dgm:constrLst>
-              </dgm:else>
-            </dgm:choose>
+          <dgm:else name="Name14">
+            <dgm:constrLst>
+              <dgm:constr type="diam" val="170"/>
+              <dgm:constr type="w" for="ch" forName="centerShape" refType="w"/>
+              <dgm:constr type="w" for="ch" forName="node" refType="w" refFor="ch" refForName="centerShape" op="equ" fact="0.7"/>
+              <dgm:constr type="sp" refType="w" refFor="ch" refForName="node" fact="0.3"/>
+              <dgm:constr type="sibSp" refType="w" refFor="ch" refForName="node" fact="0.3"/>
+              <dgm:constr type="primFontSz" for="ch" forName="centerShape" val="65"/>
+              <dgm:constr type="primFontSz" for="des" forName="node" refType="primFontSz" refFor="ch" refForName="centerShape" fact="0.78"/>
+              <dgm:constr type="primFontSz" for="ch" forName="node" refType="primFontSz" refFor="ch" refForName="centerShape" op="lte" fact="0.95"/>
+              <dgm:constr type="diam" for="ch" forName="sibTrans" refType="diam" op="equ"/>
+              <dgm:constr type="h" for="ch" forName="sibTrans" refType="w" refFor="ch" refForName="node" fact="0.24"/>
+              <dgm:constr type="w" for="ch" forName="dummy" val="1"/>
+            </dgm:constrLst>
           </dgm:else>
         </dgm:choose>
       </dgm:if>
-      <dgm:else name="Name12">
-        <dgm:choose name="Name13">
-          <dgm:if name="Name14" axis="ch ch" ptType="node node" st="1 1" cnt="1 0" func="cnt" op="gt" val="0">
-            <dgm:choose name="Name15">
-              <dgm:if name="Name16" axis="ch ch" ptType="node node" st="2 1" cnt="1 0" func="cnt" op="gt" val="0">
-                <dgm:constrLst>
-                  <dgm:constr type="primFontSz" for="des" forName="middleBoxParent" val="65"/>
-                  <dgm:constr type="primFontSz" for="des" forName="mChild" val="65"/>
-                  <dgm:constr type="primFontSz" for="des" forName="outerBoxParent" refType="primFontSz" refFor="des" refForName="middleBoxParent" op="equ"/>
-                  <dgm:constr type="primFontSz" for="des" forName="centerBoxParent" refType="primFontSz" refFor="des" refForName="middleBoxParent" op="equ"/>
-                  <dgm:constr type="primFontSz" for="des" forName="oChild" refType="primFontSz" refFor="des" refForName="mChild" op="equ"/>
-                  <dgm:constr type="primFontSz" for="des" forName="cChild" refType="primFontSz" refFor="des" refForName="mChild" op="equ"/>
-                  <dgm:constr type="l" for="ch" forName="outerBox"/>
-                  <dgm:constr type="t" for="ch" forName="outerBox"/>
-                  <dgm:constr type="w" for="ch" forName="outerBox" refType="w"/>
-                  <dgm:constr type="h" for="ch" forName="outerBox" refType="h"/>
-                  <dgm:constr type="l" for="ch" forName="middleBox" refType="w" fact="0.025"/>
-                  <dgm:constr type="t" for="ch" forName="middleBox" refType="h" fact="0.25"/>
-                  <dgm:constr type="w" for="ch" forName="middleBox" refType="w" fact="0.775"/>
-                  <dgm:constr type="h" for="ch" forName="middleBox" refType="h" fact="0.7"/>
-                  <dgm:constr type="l" for="ch" forName="centerBox" refType="w" fact="0.05"/>
-                  <dgm:constr type="t" for="ch" forName="centerBox" refType="h" fact="0.5"/>
-                  <dgm:constr type="w" for="ch" forName="centerBox" refType="w" fact="0.55"/>
-                  <dgm:constr type="h" for="ch" forName="centerBox" refType="h" fact="0.4"/>
-                  <dgm:constr type="userA" for="des" forName="outerSibTrans" refType="w"/>
-                  <dgm:constr type="userA" for="des" forName="middleSibTrans" refType="w"/>
-                  <dgm:constr type="userA" for="des" forName="centerSibTrans" refType="w"/>
-                </dgm:constrLst>
-              </dgm:if>
-              <dgm:else name="Name17">
-                <dgm:constrLst>
-                  <dgm:constr type="primFontSz" for="des" forName="middleBoxParent" val="65"/>
-                  <dgm:constr type="primFontSz" for="des" forName="mChild" val="65"/>
-                  <dgm:constr type="primFontSz" for="des" forName="outerBoxParent" refType="primFontSz" refFor="des" refForName="middleBoxParent" op="equ"/>
-                  <dgm:constr type="primFontSz" for="des" forName="centerBoxParent" refType="primFontSz" refFor="des" refForName="middleBoxParent" op="equ"/>
-                  <dgm:constr type="primFontSz" for="des" forName="oChild" refType="primFontSz" refFor="des" refForName="mChild" op="equ"/>
-                  <dgm:constr type="primFontSz" for="des" forName="cChild" refType="primFontSz" refFor="des" refForName="mChild" op="equ"/>
-                  <dgm:constr type="l" for="ch" forName="outerBox"/>
-                  <dgm:constr type="t" for="ch" forName="outerBox"/>
-                  <dgm:constr type="w" for="ch" forName="outerBox" refType="w"/>
-                  <dgm:constr type="h" for="ch" forName="outerBox" refType="h"/>
-                  <dgm:constr type="l" for="ch" forName="middleBox" refType="w" fact="0.025"/>
-                  <dgm:constr type="t" for="ch" forName="middleBox" refType="h" fact="0.25"/>
-                  <dgm:constr type="w" for="ch" forName="middleBox" refType="w" fact="0.775"/>
-                  <dgm:constr type="h" for="ch" forName="middleBox" refType="h" fact="0.7"/>
-                  <dgm:constr type="l" for="ch" forName="centerBox" refType="w" fact="0.05"/>
-                  <dgm:constr type="t" for="ch" forName="centerBox" refType="h" fact="0.5"/>
-                  <dgm:constr type="w" for="ch" forName="centerBox" refType="w" fact="0.725"/>
-                  <dgm:constr type="h" for="ch" forName="centerBox" refType="h" fact="0.4"/>
-                  <dgm:constr type="userA" for="des" forName="outerSibTrans" refType="w"/>
-                  <dgm:constr type="userA" for="des" forName="middleSibTrans" refType="w"/>
-                  <dgm:constr type="userA" for="des" forName="centerSibTrans" refType="w"/>
-                </dgm:constrLst>
-              </dgm:else>
-            </dgm:choose>
+      <dgm:else name="Name15">
+        <dgm:choose name="Name16">
+          <dgm:if name="Name17" axis="ch ch" ptType="node node" st="1 1" cnt="1 0" func="cnt" op="equ" val="1">
+            <dgm:constrLst>
+              <dgm:constr type="diam" val="170"/>
+              <dgm:constr type="w" for="ch" forName="centerShape" refType="w"/>
+              <dgm:constr type="w" for="ch" forName="oneComp" refType="w" refFor="ch" refForName="centerShape" op="equ" fact="0.7"/>
+              <dgm:constr type="sp" refType="w" refFor="ch" refForName="oneComp" fact="0.3"/>
+              <dgm:constr type="sibSp" refType="w" refFor="ch" refForName="oneComp" fact="0.3"/>
+              <dgm:constr type="primFontSz" for="ch" forName="centerShape" val="65"/>
+              <dgm:constr type="primFontSz" for="des" forName="oneNode" refType="primFontSz" refFor="ch" refForName="centerShape" fact="0.95"/>
+              <dgm:constr type="primFontSz" for="ch" forName="oneNode" refType="primFontSz" refFor="ch" refForName="centerShape" op="lte" fact="0.95"/>
+              <dgm:constr type="diam" for="ch" forName="singleconn" refType="diam"/>
+              <dgm:constr type="h" for="ch" forName="singleconn" refType="w" refFor="ch" refForName="oneComp" fact="0.24"/>
+              <dgm:constr type="diam" for="ch" refType="diam" op="equ"/>
+              <dgm:constr type="w" for="ch" forName="dummya" refType="w" refFor="ch" refForName="oneComp" op="equ"/>
+              <dgm:constr type="w" for="ch" forName="dummyb" refType="w" refFor="ch" refForName="oneComp" op="equ"/>
+              <dgm:constr type="w" for="ch" forName="dummyc" refType="w" refFor="ch" refForName="oneComp" op="equ"/>
+            </dgm:constrLst>
           </dgm:if>
           <dgm:else name="Name18">
-            <dgm:choose name="Name19">
-              <dgm:if name="Name20" axis="ch ch" ptType="node node" st="2 1" cnt="1 0" func="cnt" op="gt" val="0">
-                <dgm:constrLst>
-                  <dgm:constr type="primFontSz" for="des" forName="middleBoxParent" val="65"/>
-                  <dgm:constr type="primFontSz" for="des" forName="mChild" val="65"/>
-                  <dgm:constr type="primFontSz" for="des" forName="outerBoxParent" refType="primFontSz" refFor="des" refForName="middleBoxParent" op="equ"/>
-                  <dgm:constr type="primFontSz" for="des" forName="centerBoxParent" refType="primFontSz" refFor="des" refForName="middleBoxParent" op="equ"/>
-                  <dgm:constr type="primFontSz" for="des" forName="oChild" refType="primFontSz" refFor="des" refForName="mChild" op="equ"/>
-                  <dgm:constr type="primFontSz" for="des" forName="cChild" refType="primFontSz" refFor="des" refForName="mChild" op="equ"/>
-                  <dgm:constr type="l" for="ch" forName="outerBox"/>
-                  <dgm:constr type="t" for="ch" forName="outerBox"/>
-                  <dgm:constr type="w" for="ch" forName="outerBox" refType="w"/>
-                  <dgm:constr type="h" for="ch" forName="outerBox" refType="h"/>
-                  <dgm:constr type="l" for="ch" forName="middleBox" refType="w" fact="0.025"/>
-                  <dgm:constr type="t" for="ch" forName="middleBox" refType="h" fact="0.25"/>
-                  <dgm:constr type="w" for="ch" forName="middleBox" refType="w" fact="0.95"/>
-                  <dgm:constr type="h" for="ch" forName="middleBox" refType="h" fact="0.7"/>
-                  <dgm:constr type="l" for="ch" forName="centerBox" refType="w" fact="0.05"/>
-                  <dgm:constr type="t" for="ch" forName="centerBox" refType="h" fact="0.5"/>
-                  <dgm:constr type="w" for="ch" forName="centerBox" refType="w" fact="0.69"/>
-                  <dgm:constr type="h" for="ch" forName="centerBox" refType="h" fact="0.4"/>
-                  <dgm:constr type="userA" for="des" forName="outerSibTrans" refType="w"/>
-                  <dgm:constr type="userA" for="des" forName="middleSibTrans" refType="w"/>
-                  <dgm:constr type="userA" for="des" forName="centerSibTrans" refType="w"/>
-                </dgm:constrLst>
-              </dgm:if>
-              <dgm:else name="Name21">
-                <dgm:constrLst>
-                  <dgm:constr type="primFontSz" for="des" forName="middleBoxParent" val="65"/>
-                  <dgm:constr type="primFontSz" for="des" forName="mChild" val="65"/>
-                  <dgm:constr type="primFontSz" for="des" forName="outerBoxParent" refType="primFontSz" refFor="des" refForName="middleBoxParent" op="equ"/>
-                  <dgm:constr type="primFontSz" for="des" forName="centerBoxParent" refType="primFontSz" refFor="des" refForName="middleBoxParent" op="equ"/>
-                  <dgm:constr type="primFontSz" for="des" forName="oChild" refType="primFontSz" refFor="des" refForName="mChild" op="equ"/>
-                  <dgm:constr type="primFontSz" for="des" forName="cChild" refType="primFontSz" refFor="des" refForName="mChild" op="equ"/>
-                  <dgm:constr type="l" for="ch" forName="outerBox"/>
-                  <dgm:constr type="t" for="ch" forName="outerBox"/>
-                  <dgm:constr type="w" for="ch" forName="outerBox" refType="w"/>
-                  <dgm:constr type="h" for="ch" forName="outerBox" refType="h"/>
-                  <dgm:constr type="l" for="ch" forName="middleBox" refType="w" fact="0.025"/>
-                  <dgm:constr type="t" for="ch" forName="middleBox" refType="h" fact="0.25"/>
-                  <dgm:constr type="w" for="ch" forName="middleBox" refType="w" fact="0.95"/>
-                  <dgm:constr type="h" for="ch" forName="middleBox" refType="h" fact="0.7"/>
-                  <dgm:constr type="l" for="ch" forName="centerBox" refType="w" fact="0.05"/>
-                  <dgm:constr type="t" for="ch" forName="centerBox" refType="h" fact="0.5"/>
-                  <dgm:constr type="w" for="ch" forName="centerBox" refType="w" fact="0.9"/>
-                  <dgm:constr type="h" for="ch" forName="centerBox" refType="h" fact="0.4"/>
-                  <dgm:constr type="userA" for="des" forName="outerSibTrans" refType="w"/>
-                  <dgm:constr type="userA" for="des" forName="middleSibTrans" refType="w"/>
-                  <dgm:constr type="userA" for="des" forName="centerSibTrans" refType="w"/>
-                </dgm:constrLst>
-              </dgm:else>
-            </dgm:choose>
+            <dgm:constrLst>
+              <dgm:constr type="diam" val="170"/>
+              <dgm:constr type="w" for="ch" forName="centerShape" refType="w"/>
+              <dgm:constr type="w" for="ch" forName="node" refType="w" refFor="ch" refForName="centerShape" op="equ" fact="0.7"/>
+              <dgm:constr type="sp" refType="w" refFor="ch" refForName="node" fact="0.3"/>
+              <dgm:constr type="sibSp" refType="w" refFor="ch" refForName="node" fact="0.3"/>
+              <dgm:constr type="primFontSz" for="ch" forName="centerShape" val="65"/>
+              <dgm:constr type="primFontSz" for="des" forName="node" refType="primFontSz" refFor="ch" refForName="centerShape" fact="0.78"/>
+              <dgm:constr type="primFontSz" for="ch" forName="node" refType="primFontSz" refFor="ch" refForName="centerShape" op="lte" fact="0.95"/>
+              <dgm:constr type="diam" for="ch" ptType="sibTrans" refType="diam" fact="-1"/>
+              <dgm:constr type="h" for="ch" forName="sibTrans" refType="w" refFor="ch" refForName="node" fact="0.24"/>
+              <dgm:constr type="diam" for="ch" refType="diam" op="equ" fact="-1"/>
+              <dgm:constr type="w" for="ch" forName="dummy" val="1"/>
+            </dgm:constrLst>
           </dgm:else>
         </dgm:choose>
       </dgm:else>
     </dgm:choose>
-    <dgm:ruleLst/>
-    <dgm:choose name="Name22">
-      <dgm:if name="Name23" axis="root ch" ptType="all node" st="1 1" cnt="0 0" func="cnt" op="gte" val="1">
-        <dgm:layoutNode name="outerBox" styleLbl="node1">
-          <dgm:alg type="composite">
-            <dgm:param type="horzAlign" val="none"/>
-            <dgm:param type="vertAlign" val="none"/>
-          </dgm:alg>
-          <dgm:shape xmlns:r="http://schemas.openxmlformats.org/officeDocument/2006/relationships" r:blip="">
-            <dgm:adjLst/>
-          </dgm:shape>
-          <dgm:presOf/>
-          <dgm:choose name="Name24">
-            <dgm:if name="Name25" axis="root ch" ptType="all node" st="1 1" cnt="0 0" func="cnt" op="gt" val="1">
-              <dgm:choose name="Name26">
-                <dgm:if name="Name27" func="var" arg="dir" op="equ" val="norm">
-                  <dgm:constrLst>
-                    <dgm:constr type="l" for="ch" forName="outerBoxParent"/>
-                    <dgm:constr type="t" for="ch" forName="outerBoxParent"/>
-                    <dgm:constr type="w" for="ch" forName="outerBoxParent" refType="w"/>
-                    <dgm:constr type="h" for="ch" forName="outerBoxParent" refType="h"/>
-                    <dgm:constr type="bMarg" for="ch" forName="outerBoxParent" refType="h" fact="2.2"/>
-                    <dgm:constr type="l" for="ch" forName="outerBoxChildren" refType="w" fact="0.025"/>
-                    <dgm:constr type="t" for="ch" forName="outerBoxChildren" refType="h" fact="0.25"/>
-                    <dgm:constr type="w" for="ch" forName="outerBoxChildren" refType="w" fact="0.15"/>
-                    <dgm:constr type="h" for="ch" forName="outerBoxChildren" refType="h" fact="0.7"/>
-                  </dgm:constrLst>
-                </dgm:if>
-                <dgm:else name="Name28">
-                  <dgm:constrLst>
-                    <dgm:constr type="l" for="ch" forName="outerBoxParent"/>
-                    <dgm:constr type="t" for="ch" forName="outerBoxParent"/>
-                    <dgm:constr type="w" for="ch" forName="outerBoxParent" refType="w"/>
-                    <dgm:constr type="h" for="ch" forName="outerBoxParent" refType="h"/>
-                    <dgm:constr type="bMarg" for="ch" forName="outerBoxParent" refType="h" fact="2.2"/>
-                    <dgm:constr type="l" for="ch" forName="outerBoxChildren" refType="w" fact="0.825"/>
-                    <dgm:constr type="t" for="ch" forName="outerBoxChildren" refType="h" fact="0.25"/>
-                    <dgm:constr type="w" for="ch" forName="outerBoxChildren" refType="w" fact="0.15"/>
-                    <dgm:constr type="h" for="ch" forName="outerBoxChildren" refType="h" fact="0.7"/>
-                  </dgm:constrLst>
-                </dgm:else>
-              </dgm:choose>
-            </dgm:if>
-            <dgm:else name="Name29">
-              <dgm:constrLst>
-                <dgm:constr type="l" for="ch" forName="outerBoxParent"/>
-                <dgm:constr type="t" for="ch" forName="outerBoxParent"/>
-                <dgm:constr type="w" for="ch" forName="outerBoxParent" refType="w"/>
-                <dgm:constr type="h" for="ch" forName="outerBoxParent" refType="h"/>
-                <dgm:constr type="bMarg" for="ch" forName="outerBoxParent" refType="h" fact="1.75"/>
-                <dgm:constr type="l" for="ch" forName="outerBoxChildren" refType="w" fact="0.025"/>
-                <dgm:constr type="t" for="ch" forName="outerBoxChildren" refType="h" fact="0.45"/>
-                <dgm:constr type="w" for="ch" forName="outerBoxChildren" refType="w" fact="0.95"/>
-                <dgm:constr type="h" for="ch" forName="outerBoxChildren" refType="h" fact="0.45"/>
-              </dgm:constrLst>
-            </dgm:else>
-          </dgm:choose>
-          <dgm:ruleLst/>
-          <dgm:layoutNode name="outerBoxParent" styleLbl="node1">
-            <dgm:alg type="tx">
-              <dgm:param type="txAnchorVert" val="t"/>
-              <dgm:param type="parTxLTRAlign" val="l"/>
-              <dgm:param type="parTxRTLAlign" val="r"/>
-            </dgm:alg>
-            <dgm:shape xmlns:r="http://schemas.openxmlformats.org/officeDocument/2006/relationships" type="roundRect" r:blip="">
-              <dgm:adjLst>
-                <dgm:adj idx="1" val="0.085"/>
-              </dgm:adjLst>
-            </dgm:shape>
-            <dgm:presOf axis="ch" ptType="node" cnt="1"/>
-            <dgm:constrLst>
-              <dgm:constr type="tMarg" refType="primFontSz" fact="0.3"/>
-              <dgm:constr type="lMarg" refType="primFontSz" fact="0.3"/>
-              <dgm:constr type="rMarg" refType="primFontSz" fact="0.3"/>
-            </dgm:constrLst>
-            <dgm:ruleLst>
-              <dgm:rule type="primFontSz" val="5" fact="NaN" max="NaN"/>
-            </dgm:ruleLst>
-          </dgm:layoutNode>
-          <dgm:layoutNode name="outerBoxChildren">
-            <dgm:choose name="Name30">
-              <dgm:if name="Name31" axis="root ch" ptType="all node" st="1 1" cnt="0 0" func="cnt" op="gt" val="1">
-                <dgm:alg type="lin">
-                  <dgm:param type="linDir" val="fromT"/>
-                  <dgm:param type="vertAlign" val="t"/>
-                </dgm:alg>
-              </dgm:if>
-              <dgm:else name="Name32">
-                <dgm:choose name="Name33">
-                  <dgm:if name="Name34" func="var" arg="dir" op="equ" val="norm">
-                    <dgm:alg type="lin">
-                      <dgm:param type="horzAlign" val="l"/>
-                    </dgm:alg>
-                  </dgm:if>
-                  <dgm:else name="Name35">
-                    <dgm:alg type="lin">
-                      <dgm:param type="linDir" val="fromR"/>
-                      <dgm:param type="horzAlign" val="r"/>
-                    </dgm:alg>
-                  </dgm:else>
-                </dgm:choose>
-              </dgm:else>
-            </dgm:choose>
-            <dgm:shape xmlns:r="http://schemas.openxmlformats.org/officeDocument/2006/relationships" r:blip="">
-              <dgm:adjLst/>
-            </dgm:shape>
-            <dgm:presOf/>
-            <dgm:constrLst>
-              <dgm:constr type="w" for="ch" forName="oChild" refType="w"/>
-              <dgm:constr type="h" for="ch" forName="oChild" refType="h"/>
-            </dgm:constrLst>
-            <dgm:ruleLst/>
-            <dgm:forEach name="Name36" axis="ch ch" ptType="node node" st="1 1" cnt="1 0">
-              <dgm:layoutNode name="oChild" styleLbl="fgAcc1">
+    <dgm:ruleLst>
+      <dgm:rule type="diam" val="INF" fact="NaN" max="NaN"/>
+    </dgm:ruleLst>
+    <dgm:forEach name="Name19" axis="ch" ptType="node" cnt="1">
+      <dgm:layoutNode name="centerShape" styleLbl="node0">
+        <dgm:alg type="tx"/>
+        <dgm:shape xmlns:r="http://schemas.openxmlformats.org/officeDocument/2006/relationships" type="ellipse" r:blip="">
+          <dgm:adjLst/>
+        </dgm:shape>
+        <dgm:presOf axis="self"/>
+        <dgm:constrLst>
+          <dgm:constr type="h" refType="w"/>
+          <dgm:constr type="tMarg" refType="primFontSz" fact="0.1"/>
+          <dgm:constr type="bMarg" refType="primFontSz" fact="0.1"/>
+          <dgm:constr type="lMarg" refType="primFontSz" fact="0.1"/>
+          <dgm:constr type="rMarg" refType="primFontSz" fact="0.1"/>
+        </dgm:constrLst>
+        <dgm:ruleLst>
+          <dgm:rule type="primFontSz" val="5" fact="NaN" max="NaN"/>
+        </dgm:ruleLst>
+      </dgm:layoutNode>
+      <dgm:forEach name="Name20" axis="ch">
+        <dgm:forEach name="Name21" axis="self" ptType="node">
+          <dgm:choose name="Name22">
+            <dgm:if name="Name23" axis="par ch" ptType="node node" func="cnt" op="gt" val="1">
+              <dgm:layoutNode name="node" styleLbl="node1">
                 <dgm:varLst>
                   <dgm:bulletEnabled val="1"/>
                 </dgm:varLst>
-                <dgm:alg type="tx"/>
-                <dgm:shape xmlns:r="http://schemas.openxmlformats.org/officeDocument/2006/relationships" type="roundRect" r:blip="">
-                  <dgm:adjLst>
-                    <dgm:adj idx="1" val="0.105"/>
-                  </dgm:adjLst>
+                <dgm:alg type="tx">
+                  <dgm:param type="txAnchorVertCh" val="mid"/>
+                </dgm:alg>
+                <dgm:shape xmlns:r="http://schemas.openxmlformats.org/officeDocument/2006/relationships" type="ellipse" r:blip="">
+                  <dgm:adjLst/>
                 </dgm:shape>
                 <dgm:presOf axis="desOrSelf" ptType="node"/>
                 <dgm:constrLst>
-                  <dgm:constr type="tMarg" refType="primFontSz" fact="0.3"/>
-                  <dgm:constr type="bMarg" refType="primFontSz" fact="0.3"/>
-                  <dgm:constr type="lMarg" refType="primFontSz" fact="0.3"/>
-                  <dgm:constr type="rMarg" refType="primFontSz" fact="0.3"/>
+                  <dgm:constr type="h" refType="w"/>
+                  <dgm:constr type="tMarg" refType="primFontSz" fact="0.1"/>
+                  <dgm:constr type="bMarg" refType="primFontSz" fact="0.1"/>
+                  <dgm:constr type="lMarg" refType="primFontSz" fact="0.1"/>
+                  <dgm:constr type="rMarg" refType="primFontSz" fact="0.1"/>
                 </dgm:constrLst>
                 <dgm:ruleLst>
                   <dgm:rule type="primFontSz" val="5" fact="NaN" max="NaN"/>
                 </dgm:ruleLst>
               </dgm:layoutNode>
-              <dgm:forEach name="Name37" axis="followSib" ptType="sibTrans" cnt="1">
-                <dgm:layoutNode name="outerSibTrans">
+              <dgm:layoutNode name="dummy">
+                <dgm:alg type="sp"/>
+                <dgm:shape xmlns:r="http://schemas.openxmlformats.org/officeDocument/2006/relationships" r:blip="">
+                  <dgm:adjLst/>
+                </dgm:shape>
+                <dgm:presOf/>
+                <dgm:constrLst>
+                  <dgm:constr type="h" refType="w"/>
+                </dgm:constrLst>
+                <dgm:ruleLst/>
+              </dgm:layoutNode>
+              <dgm:forEach name="sibTransForEach" axis="followSib" ptType="sibTrans" hideLastTrans="0" cnt="1">
+                <dgm:layoutNode name="sibTrans" styleLbl="sibTrans2D1">
+                  <dgm:alg type="conn">
+                    <dgm:param type="connRout" val="curve"/>
+                    <dgm:param type="begPts" val="ctr"/>
+                    <dgm:param type="endPts" val="ctr"/>
+                    <dgm:param type="begSty" val="noArr"/>
+                    <dgm:param type="endSty" val="noArr"/>
+                    <dgm:param type="dstNode" val="node"/>
+                  </dgm:alg>
+                  <dgm:shape xmlns:r="http://schemas.openxmlformats.org/officeDocument/2006/relationships" type="conn" r:blip="" zOrderOff="-999">
+                    <dgm:adjLst/>
+                  </dgm:shape>
+                  <dgm:presOf axis="self"/>
+                  <dgm:constrLst>
+                    <dgm:constr type="begPad"/>
+                    <dgm:constr type="endPad"/>
+                  </dgm:constrLst>
+                  <dgm:ruleLst/>
+                </dgm:layoutNode>
+              </dgm:forEach>
+            </dgm:if>
+            <dgm:if name="Name24" axis="par ch" ptType="node node" func="cnt" op="equ" val="1">
+              <dgm:layoutNode name="oneComp">
+                <dgm:alg type="composite">
+                  <dgm:param type="ar" val="1"/>
+                </dgm:alg>
+                <dgm:shape xmlns:r="http://schemas.openxmlformats.org/officeDocument/2006/relationships" r:blip="">
+                  <dgm:adjLst/>
+                </dgm:shape>
+                <dgm:presOf/>
+                <dgm:constrLst>
+                  <dgm:constr type="h" refType="w"/>
+                  <dgm:constr type="l" for="ch" forName="dummyConnPt" refType="w" fact="0.5"/>
+                  <dgm:constr type="t" for="ch" forName="dummyConnPt" refType="w" fact="0.5"/>
+                  <dgm:constr type="l" for="ch" forName="oneNode"/>
+                  <dgm:constr type="t" for="ch" forName="oneNode"/>
+                  <dgm:constr type="h" for="ch" forName="oneNode" refType="h"/>
+                  <dgm:constr type="w" for="ch" forName="oneNode" refType="w"/>
+                </dgm:constrLst>
+                <dgm:ruleLst/>
+                <dgm:layoutNode name="dummyConnPt" styleLbl="node1">
                   <dgm:alg type="sp"/>
                   <dgm:shape xmlns:r="http://schemas.openxmlformats.org/officeDocument/2006/relationships" r:blip="">
                     <dgm:adjLst/>
                   </dgm:shape>
                   <dgm:presOf/>
                   <dgm:constrLst>
-                    <dgm:constr type="userA"/>
-                    <dgm:constr type="w" refType="userA" fact="0.015"/>
-                    <dgm:constr type="h" refType="userA" fact="0.015"/>
+                    <dgm:constr type="w" val="1"/>
+                    <dgm:constr type="h" val="1"/>
                   </dgm:constrLst>
                   <dgm:ruleLst/>
                 </dgm:layoutNode>
-              </dgm:forEach>
-            </dgm:forEach>
-          </dgm:layoutNode>
-        </dgm:layoutNode>
-      </dgm:if>
-      <dgm:else name="Name38"/>
-    </dgm:choose>
-    <dgm:choose name="Name39">
-      <dgm:if name="Name40" axis="root ch" ptType="all node" st="1 1" cnt="0 0" func="cnt" op="gte" val="2">
-        <dgm:layoutNode name="middleBox">
-          <dgm:alg type="composite">
-            <dgm:param type="horzAlign" val="none"/>
-            <dgm:param type="vertAlign" val="none"/>
-          </dgm:alg>
-          <dgm:shape xmlns:r="http://schemas.openxmlformats.org/officeDocument/2006/relationships" r:blip="">
-            <dgm:adjLst/>
-          </dgm:shape>
-          <dgm:presOf/>
-          <dgm:choose name="Name41">
-            <dgm:if name="Name42" axis="root ch" ptType="all node" st="1 1" cnt="0 0" func="cnt" op="gt" val="2">
-              <dgm:choose name="Name43">
-                <dgm:if name="Name44" func="var" arg="dir" op="equ" val="norm">
-                  <dgm:constrLst>
-                    <dgm:constr type="l" for="ch" forName="middleBoxParent"/>
-                    <dgm:constr type="t" for="ch" forName="middleBoxParent"/>
-                    <dgm:constr type="w" for="ch" forName="middleBoxParent" refType="w"/>
-                    <dgm:constr type="h" for="ch" forName="middleBoxParent" refType="h"/>
-                    <dgm:constr type="bMarg" for="ch" forName="middleBoxParent" refType="h" fact="1.8"/>
-                    <dgm:constr type="l" for="ch" forName="middleBoxChildren" refType="w" fact="0.025"/>
-                    <dgm:constr type="t" for="ch" forName="middleBoxChildren" refType="h" fact="0.35"/>
-                    <dgm:constr type="w" for="ch" forName="middleBoxChildren" refType="w" fact="0.2"/>
-                    <dgm:constr type="h" for="ch" forName="middleBoxChildren" refType="h" fact="0.575"/>
-                  </dgm:constrLst>
-                </dgm:if>
-                <dgm:else name="Name45">
-                  <dgm:constrLst>
-                    <dgm:constr type="l" for="ch" forName="middleBoxParent"/>
-                    <dgm:constr type="t" for="ch" forName="middleBoxParent"/>
-                    <dgm:constr type="w" for="ch" forName="middleBoxParent" refType="w"/>
-                    <dgm:constr type="h" for="ch" forName="middleBoxParent" refType="h"/>
-                    <dgm:constr type="bMarg" for="ch" forName="middleBoxParent" refType="h" fact="1.8"/>
-                    <dgm:constr type="l" for="ch" forName="middleBoxChildren" refType="w" fact="0.775"/>
-                    <dgm:constr type="t" for="ch" forName="middleBoxChildren" refType="h" fact="0.35"/>
-                    <dgm:constr type="w" for="ch" forName="middleBoxChildren" refType="w" fact="0.2"/>
-                    <dgm:constr type="h" for="ch" forName="middleBoxChildren" refType="h" fact="0.575"/>
-                  </dgm:constrLst>
-                </dgm:else>
-              </dgm:choose>
-            </dgm:if>
-            <dgm:else name="Name46">
-              <dgm:constrLst>
-                <dgm:constr type="l" for="ch" forName="middleBoxParent"/>
-                <dgm:constr type="t" for="ch" forName="middleBoxParent"/>
-                <dgm:constr type="w" for="ch" forName="middleBoxParent" refType="w"/>
-                <dgm:constr type="h" for="ch" forName="middleBoxParent" refType="h"/>
-                <dgm:constr type="bMarg" for="ch" forName="middleBoxParent" refType="h" fact="1.8"/>
-                <dgm:constr type="l" for="ch" forName="middleBoxChildren" refType="w" fact="0.025"/>
-                <dgm:constr type="t" for="ch" forName="middleBoxChildren" refType="h" fact="0.45"/>
-                <dgm:constr type="w" for="ch" forName="middleBoxChildren" refType="w" fact="0.95"/>
-                <dgm:constr type="h" for="ch" forName="middleBoxChildren" refType="h" fact="0.45"/>
-              </dgm:constrLst>
-            </dgm:else>
-          </dgm:choose>
-          <dgm:ruleLst/>
-          <dgm:layoutNode name="middleBoxParent" styleLbl="node1">
-            <dgm:alg type="tx">
-              <dgm:param type="txAnchorVert" val="t"/>
-              <dgm:param type="parTxLTRAlign" val="l"/>
-              <dgm:param type="parTxRTLAlign" val="r"/>
-            </dgm:alg>
-            <dgm:shape xmlns:r="http://schemas.openxmlformats.org/officeDocument/2006/relationships" type="roundRect" r:blip="">
-              <dgm:adjLst>
-                <dgm:adj idx="1" val="0.105"/>
-              </dgm:adjLst>
-            </dgm:shape>
-            <dgm:presOf axis="ch" ptType="node" st="2" cnt="1"/>
-            <dgm:constrLst>
-              <dgm:constr type="tMarg" refType="primFontSz" fact="0.3"/>
-              <dgm:constr type="lMarg" refType="primFontSz" fact="0.3"/>
-              <dgm:constr type="rMarg" refType="primFontSz" fact="0.3"/>
-            </dgm:constrLst>
-            <dgm:ruleLst>
-              <dgm:rule type="primFontSz" val="5" fact="NaN" max="NaN"/>
-            </dgm:ruleLst>
-          </dgm:layoutNode>
-          <dgm:layoutNode name="middleBoxChildren">
-            <dgm:choose name="Name47">
-              <dgm:if name="Name48" axis="root ch" ptType="all node" st="1 1" cnt="0 0" func="cnt" op="gt" val="2">
-                <dgm:alg type="lin">
-                  <dgm:param type="linDir" val="fromT"/>
-                  <dgm:param type="vertAlign" val="t"/>
-                </dgm:alg>
-              </dgm:if>
-              <dgm:else name="Name49">
-                <dgm:choose name="Name50">
-                  <dgm:if name="Name51" func="var" arg="dir" op="equ" val="norm">
-                    <dgm:alg type="lin">
-                      <dgm:param type="horzAlign" val="l"/>
-                    </dgm:alg>
-                  </dgm:if>
-                  <dgm:else name="Name52">
-                    <dgm:alg type="lin">
-                      <dgm:param type="linDir" val="fromR"/>
-                      <dgm:param type="horzAlign" val="r"/>
-                    </dgm:alg>
-                  </dgm:else>
-                </dgm:choose>
-              </dgm:else>
-            </dgm:choose>
-            <dgm:shape xmlns:r="http://schemas.openxmlformats.org/officeDocument/2006/relationships" r:blip="">
-              <dgm:adjLst/>
-            </dgm:shape>
-            <dgm:presOf/>
-            <dgm:constrLst>
-              <dgm:constr type="w" for="ch" forName="mChild" refType="w"/>
-              <dgm:constr type="h" for="ch" forName="mChild" refType="h"/>
-            </dgm:constrLst>
-            <dgm:ruleLst/>
-            <dgm:forEach name="Name53" axis="ch ch" ptType="node node" st="2 1" cnt="1 0">
-              <dgm:layoutNode name="mChild" styleLbl="fgAcc1">
-                <dgm:varLst>
-                  <dgm:bulletEnabled val="1"/>
-                </dgm:varLst>
-                <dgm:alg type="tx"/>
-                <dgm:shape xmlns:r="http://schemas.openxmlformats.org/officeDocument/2006/relationships" type="roundRect" r:blip="">
-                  <dgm:adjLst>
-                    <dgm:adj idx="1" val="0.105"/>
-                  </dgm:adjLst>
-                </dgm:shape>
-                <dgm:presOf axis="desOrSelf" ptType="node"/>
-                <dgm:constrLst>
-                  <dgm:constr type="tMarg" refType="primFontSz" fact="0.3"/>
-                  <dgm:constr type="bMarg" refType="primFontSz" fact="0.3"/>
-                  <dgm:constr type="lMarg" refType="primFontSz" fact="0.3"/>
-                  <dgm:constr type="rMarg" refType="primFontSz" fact="0.3"/>
-                </dgm:constrLst>
-                <dgm:ruleLst>
-                  <dgm:rule type="primFontSz" val="5" fact="NaN" max="NaN"/>
-                </dgm:ruleLst>
-              </dgm:layoutNode>
-              <dgm:forEach name="Name54" axis="followSib" ptType="sibTrans" cnt="1">
-                <dgm:layoutNode name="middleSibTrans">
-                  <dgm:alg type="sp"/>
-                  <dgm:shape xmlns:r="http://schemas.openxmlformats.org/officeDocument/2006/relationships" r:blip="">
+                <dgm:layoutNode name="oneNode" styleLbl="node1">
+                  <dgm:varLst>
+                    <dgm:bulletEnabled val="1"/>
+                  </dgm:varLst>
+                  <dgm:alg type="tx">
+                    <dgm:param type="txAnchorVertCh" val="mid"/>
+                  </dgm:alg>
+                  <dgm:shape xmlns:r="http://schemas.openxmlformats.org/officeDocument/2006/relationships" type="ellipse" r:blip="">
                     <dgm:adjLst/>
                   </dgm:shape>
-                  <dgm:presOf/>
+                  <dgm:presOf axis="desOrSelf" ptType="node"/>
                   <dgm:constrLst>
-                    <dgm:constr type="userA"/>
-                    <dgm:constr type="w" refType="userA" fact="0.015"/>
-                    <dgm:constr type="h" refType="userA" fact="0.015"/>
+                    <dgm:constr type="h" refType="w"/>
+                    <dgm:constr type="tMarg" refType="primFontSz" fact="0.1"/>
+                    <dgm:constr type="bMarg" refType="primFontSz" fact="0.1"/>
+                    <dgm:constr type="lMarg" refType="primFontSz" fact="0.1"/>
+                    <dgm:constr type="rMarg" refType="primFontSz" fact="0.1"/>
                   </dgm:constrLst>
-                  <dgm:ruleLst/>
+                  <dgm:ruleLst>
+                    <dgm:rule type="primFontSz" val="5" fact="NaN" max="NaN"/>
+                  </dgm:ruleLst>
                 </dgm:layoutNode>
-              </dgm:forEach>
-            </dgm:forEach>
-          </dgm:layoutNode>
-        </dgm:layoutNode>
-      </dgm:if>
-      <dgm:else name="Name55"/>
-    </dgm:choose>
-    <dgm:choose name="Name56">
-      <dgm:if name="Name57" axis="root ch" ptType="all node" st="1 1" cnt="0 0" func="cnt" op="gte" val="3">
-        <dgm:layoutNode name="centerBox">
-          <dgm:alg type="composite">
-            <dgm:param type="horzAlign" val="none"/>
-            <dgm:param type="vertAlign" val="none"/>
-          </dgm:alg>
-          <dgm:shape xmlns:r="http://schemas.openxmlformats.org/officeDocument/2006/relationships" r:blip="">
-            <dgm:adjLst/>
-          </dgm:shape>
-          <dgm:presOf/>
-          <dgm:choose name="Name58">
-            <dgm:if name="Name59" axis="ch ch" ptType="node node" st="3 1" cnt="1 0" func="cnt" op="gt" val="0">
-              <dgm:constrLst>
-                <dgm:constr type="l" for="ch" forName="centerBoxParent"/>
-                <dgm:constr type="t" for="ch" forName="centerBoxParent"/>
-                <dgm:constr type="w" for="ch" forName="centerBoxParent" refType="w"/>
-                <dgm:constr type="h" for="ch" forName="centerBoxParent" refType="h"/>
-                <dgm:constr type="bMarg" for="ch" forName="centerBoxParent" refType="h" fact="1.6"/>
-                <dgm:constr type="l" for="ch" forName="centerBoxChildren" refType="w" fact="0.025"/>
-                <dgm:constr type="t" for="ch" forName="centerBoxChildren" refType="h" fact="0.45"/>
-                <dgm:constr type="w" for="ch" forName="centerBoxChildren" refType="w" fact="0.95"/>
-                <dgm:constr type="h" for="ch" forName="centerBoxChildren" refType="h" fact="0.45"/>
-              </dgm:constrLst>
-            </dgm:if>
-            <dgm:else name="Name60">
-              <dgm:constrLst>
-                <dgm:constr type="l" for="ch" forName="centerBoxParent"/>
-                <dgm:constr type="t" for="ch" forName="centerBoxParent"/>
-                <dgm:constr type="w" for="ch" forName="centerBoxParent" refType="w"/>
-                <dgm:constr type="h" for="ch" forName="centerBoxParent" refType="h"/>
-              </dgm:constrLst>
-            </dgm:else>
-          </dgm:choose>
-          <dgm:ruleLst/>
-          <dgm:layoutNode name="centerBoxParent" styleLbl="node1">
-            <dgm:alg type="tx">
-              <dgm:param type="txAnchorVert" val="t"/>
-              <dgm:param type="parTxLTRAlign" val="l"/>
-              <dgm:param type="parTxRTLAlign" val="r"/>
-            </dgm:alg>
-            <dgm:shape xmlns:r="http://schemas.openxmlformats.org/officeDocument/2006/relationships" type="roundRect" r:blip="">
-              <dgm:adjLst>
-                <dgm:adj idx="1" val="0.105"/>
-              </dgm:adjLst>
-            </dgm:shape>
-            <dgm:presOf axis="ch" ptType="node" st="3" cnt="1"/>
-            <dgm:constrLst>
-              <dgm:constr type="tMarg" refType="primFontSz" fact="0.3"/>
-              <dgm:constr type="lMarg" refType="primFontSz" fact="0.3"/>
-              <dgm:constr type="rMarg" refType="primFontSz" fact="0.3"/>
-            </dgm:constrLst>
-            <dgm:ruleLst>
-              <dgm:rule type="primFontSz" val="5" fact="NaN" max="NaN"/>
-            </dgm:ruleLst>
-          </dgm:layoutNode>
-          <dgm:choose name="Name61">
-            <dgm:if name="Name62" axis="ch ch" ptType="node node" st="3 1" cnt="1 0" func="cnt" op="gt" val="0">
-              <dgm:layoutNode name="centerBoxChildren">
-                <dgm:choose name="Name63">
-                  <dgm:if name="Name64" func="var" arg="dir" op="equ" val="norm">
-                    <dgm:alg type="lin">
-                      <dgm:param type="horzAlign" val="l"/>
-                    </dgm:alg>
-                  </dgm:if>
-                  <dgm:else name="Name65">
-                    <dgm:alg type="lin">
-                      <dgm:param type="linDir" val="fromR"/>
-                      <dgm:param type="horzAlign" val="r"/>
-                    </dgm:alg>
-                  </dgm:else>
-                </dgm:choose>
+              </dgm:layoutNode>
+              <dgm:layoutNode name="dummya">
+                <dgm:alg type="sp"/>
                 <dgm:shape xmlns:r="http://schemas.openxmlformats.org/officeDocument/2006/relationships" r:blip="">
                   <dgm:adjLst/>
                 </dgm:shape>
                 <dgm:presOf/>
                 <dgm:constrLst>
-                  <dgm:constr type="w" for="ch" forName="cChild" refType="w"/>
-                  <dgm:constr type="h" for="ch" forName="cChild" refType="h"/>
+                  <dgm:constr type="h" refType="w"/>
                 </dgm:constrLst>
                 <dgm:ruleLst/>
-                <dgm:forEach name="Name66" axis="ch ch" ptType="node node" st="3 1" cnt="1 0">
-                  <dgm:layoutNode name="cChild" styleLbl="fgAcc1">
-                    <dgm:varLst>
-                      <dgm:bulletEnabled val="1"/>
-                    </dgm:varLst>
-                    <dgm:alg type="tx"/>
-                    <dgm:shape xmlns:r="http://schemas.openxmlformats.org/officeDocument/2006/relationships" type="roundRect" r:blip="">
-                      <dgm:adjLst>
-                        <dgm:adj idx="1" val="0.105"/>
-                      </dgm:adjLst>
-                    </dgm:shape>
-                    <dgm:presOf axis="desOrSelf" ptType="node"/>
-                    <dgm:constrLst>
-                      <dgm:constr type="tMarg" refType="primFontSz" fact="0.3"/>
-                      <dgm:constr type="bMarg" refType="primFontSz" fact="0.3"/>
-                      <dgm:constr type="lMarg" refType="primFontSz" fact="0.3"/>
-                      <dgm:constr type="rMarg" refType="primFontSz" fact="0.3"/>
-                    </dgm:constrLst>
-                    <dgm:ruleLst>
-                      <dgm:rule type="primFontSz" val="5" fact="NaN" max="NaN"/>
-                    </dgm:ruleLst>
-                  </dgm:layoutNode>
-                  <dgm:forEach name="Name67" axis="followSib" ptType="sibTrans" cnt="1">
-                    <dgm:layoutNode name="centerSibTrans">
-                      <dgm:alg type="sp"/>
-                      <dgm:shape xmlns:r="http://schemas.openxmlformats.org/officeDocument/2006/relationships" r:blip="">
-                        <dgm:adjLst/>
-                      </dgm:shape>
-                      <dgm:presOf/>
-                      <dgm:constrLst>
-                        <dgm:constr type="userA"/>
-                        <dgm:constr type="w" refType="userA" fact="0.015"/>
-                        <dgm:constr type="h" refType="userA" fact="0.015"/>
-                      </dgm:constrLst>
-                      <dgm:ruleLst/>
-                    </dgm:layoutNode>
-                  </dgm:forEach>
-                </dgm:forEach>
               </dgm:layoutNode>
+              <dgm:layoutNode name="dummyb">
+                <dgm:alg type="sp"/>
+                <dgm:shape xmlns:r="http://schemas.openxmlformats.org/officeDocument/2006/relationships" r:blip="">
+                  <dgm:adjLst/>
+                </dgm:shape>
+                <dgm:presOf/>
+                <dgm:constrLst>
+                  <dgm:constr type="h" refType="w"/>
+                </dgm:constrLst>
+                <dgm:ruleLst/>
+              </dgm:layoutNode>
+              <dgm:layoutNode name="dummyc">
+                <dgm:alg type="sp"/>
+                <dgm:shape xmlns:r="http://schemas.openxmlformats.org/officeDocument/2006/relationships" r:blip="">
+                  <dgm:adjLst/>
+                </dgm:shape>
+                <dgm:presOf/>
+                <dgm:constrLst>
+                  <dgm:constr type="h" refType="w"/>
+                </dgm:constrLst>
+                <dgm:ruleLst/>
+              </dgm:layoutNode>
+              <dgm:forEach name="sibTransForEach1" axis="followSib" ptType="sibTrans" hideLastTrans="0" cnt="1">
+                <dgm:layoutNode name="singleconn" styleLbl="sibTrans2D1">
+                  <dgm:alg type="conn">
+                    <dgm:param type="connRout" val="longCurve"/>
+                    <dgm:param type="begPts" val="bCtr"/>
+                    <dgm:param type="endPts" val="tCtr"/>
+                    <dgm:param type="begSty" val="noArr"/>
+                    <dgm:param type="endSty" val="noArr"/>
+                    <dgm:param type="srcNode" val="dummyConnPt"/>
+                    <dgm:param type="dstNode" val="dummyConnPt"/>
+                  </dgm:alg>
+                  <dgm:shape xmlns:r="http://schemas.openxmlformats.org/officeDocument/2006/relationships" type="conn" r:blip="" zOrderOff="-999">
+                    <dgm:adjLst/>
+                  </dgm:shape>
+                  <dgm:presOf axis="self"/>
+                  <dgm:constrLst>
+                    <dgm:constr type="begPad"/>
+                    <dgm:constr type="endPad"/>
+                  </dgm:constrLst>
+                  <dgm:ruleLst/>
+                </dgm:layoutNode>
+              </dgm:forEach>
             </dgm:if>
-            <dgm:else name="Name68"/>
+            <dgm:else name="Name25"/>
           </dgm:choose>
-        </dgm:layoutNode>
-      </dgm:if>
-      <dgm:else name="Name69"/>
-    </dgm:choose>
+        </dgm:forEach>
+      </dgm:forEach>
+    </dgm:forEach>
   </dgm:layoutNode>
 </dgm:layoutDef>
 </file>
@@ -7872,7 +7795,7 @@
           <a:p>
             <a:fld id="{C5679AC8-24FE-403C-9EDF-7FB033AD0E6C}" type="datetimeFigureOut">
               <a:rPr lang="en-US" smtClean="0"/>
-              <a:t>12/11/2019</a:t>
+              <a:t>12/12/2019</a:t>
             </a:fld>
             <a:endParaRPr lang="en-US"/>
           </a:p>
@@ -8042,7 +7965,7 @@
           <a:p>
             <a:fld id="{C5679AC8-24FE-403C-9EDF-7FB033AD0E6C}" type="datetimeFigureOut">
               <a:rPr lang="en-US" smtClean="0"/>
-              <a:t>12/11/2019</a:t>
+              <a:t>12/12/2019</a:t>
             </a:fld>
             <a:endParaRPr lang="en-US"/>
           </a:p>
@@ -8222,7 +8145,7 @@
           <a:p>
             <a:fld id="{C5679AC8-24FE-403C-9EDF-7FB033AD0E6C}" type="datetimeFigureOut">
               <a:rPr lang="en-US" smtClean="0"/>
-              <a:t>12/11/2019</a:t>
+              <a:t>12/12/2019</a:t>
             </a:fld>
             <a:endParaRPr lang="en-US"/>
           </a:p>
@@ -8392,7 +8315,7 @@
           <a:p>
             <a:fld id="{C5679AC8-24FE-403C-9EDF-7FB033AD0E6C}" type="datetimeFigureOut">
               <a:rPr lang="en-US" smtClean="0"/>
-              <a:t>12/11/2019</a:t>
+              <a:t>12/12/2019</a:t>
             </a:fld>
             <a:endParaRPr lang="en-US"/>
           </a:p>
@@ -8636,7 +8559,7 @@
           <a:p>
             <a:fld id="{C5679AC8-24FE-403C-9EDF-7FB033AD0E6C}" type="datetimeFigureOut">
               <a:rPr lang="en-US" smtClean="0"/>
-              <a:t>12/11/2019</a:t>
+              <a:t>12/12/2019</a:t>
             </a:fld>
             <a:endParaRPr lang="en-US"/>
           </a:p>
@@ -8868,7 +8791,7 @@
           <a:p>
             <a:fld id="{C5679AC8-24FE-403C-9EDF-7FB033AD0E6C}" type="datetimeFigureOut">
               <a:rPr lang="en-US" smtClean="0"/>
-              <a:t>12/11/2019</a:t>
+              <a:t>12/12/2019</a:t>
             </a:fld>
             <a:endParaRPr lang="en-US"/>
           </a:p>
@@ -9235,7 +9158,7 @@
           <a:p>
             <a:fld id="{C5679AC8-24FE-403C-9EDF-7FB033AD0E6C}" type="datetimeFigureOut">
               <a:rPr lang="en-US" smtClean="0"/>
-              <a:t>12/11/2019</a:t>
+              <a:t>12/12/2019</a:t>
             </a:fld>
             <a:endParaRPr lang="en-US"/>
           </a:p>
@@ -9353,7 +9276,7 @@
           <a:p>
             <a:fld id="{C5679AC8-24FE-403C-9EDF-7FB033AD0E6C}" type="datetimeFigureOut">
               <a:rPr lang="en-US" smtClean="0"/>
-              <a:t>12/11/2019</a:t>
+              <a:t>12/12/2019</a:t>
             </a:fld>
             <a:endParaRPr lang="en-US"/>
           </a:p>
@@ -9448,7 +9371,7 @@
           <a:p>
             <a:fld id="{C5679AC8-24FE-403C-9EDF-7FB033AD0E6C}" type="datetimeFigureOut">
               <a:rPr lang="en-US" smtClean="0"/>
-              <a:t>12/11/2019</a:t>
+              <a:t>12/12/2019</a:t>
             </a:fld>
             <a:endParaRPr lang="en-US"/>
           </a:p>
@@ -9725,7 +9648,7 @@
           <a:p>
             <a:fld id="{C5679AC8-24FE-403C-9EDF-7FB033AD0E6C}" type="datetimeFigureOut">
               <a:rPr lang="en-US" smtClean="0"/>
-              <a:t>12/11/2019</a:t>
+              <a:t>12/12/2019</a:t>
             </a:fld>
             <a:endParaRPr lang="en-US"/>
           </a:p>
@@ -9982,7 +9905,7 @@
           <a:p>
             <a:fld id="{C5679AC8-24FE-403C-9EDF-7FB033AD0E6C}" type="datetimeFigureOut">
               <a:rPr lang="en-US" smtClean="0"/>
-              <a:t>12/11/2019</a:t>
+              <a:t>12/12/2019</a:t>
             </a:fld>
             <a:endParaRPr lang="en-US"/>
           </a:p>
@@ -10195,7 +10118,7 @@
           <a:p>
             <a:fld id="{C5679AC8-24FE-403C-9EDF-7FB033AD0E6C}" type="datetimeFigureOut">
               <a:rPr lang="en-US" smtClean="0"/>
-              <a:t>12/11/2019</a:t>
+              <a:t>12/12/2019</a:t>
             </a:fld>
             <a:endParaRPr lang="en-US"/>
           </a:p>
@@ -10613,7 +10536,7 @@
           <p:nvPr>
             <p:extLst>
               <p:ext uri="{D42A27DB-BD31-4B8C-83A1-F6EECF244321}">
-                <p14:modId xmlns:p14="http://schemas.microsoft.com/office/powerpoint/2010/main" val="3461790324"/>
+                <p14:modId xmlns:p14="http://schemas.microsoft.com/office/powerpoint/2010/main" val="2206232273"/>
               </p:ext>
             </p:extLst>
           </p:nvPr>

</xml_diff>